<commit_message>
Modified presentation slides for the data science part
</commit_message>
<xml_diff>
--- a/docs/final_presentation.pptx
+++ b/docs/final_presentation.pptx
@@ -18,11 +18,11 @@
     <p:sldId id="282" r:id="rId9"/>
     <p:sldId id="283" r:id="rId10"/>
     <p:sldId id="284" r:id="rId11"/>
-    <p:sldId id="285" r:id="rId12"/>
-    <p:sldId id="267" r:id="rId13"/>
-    <p:sldId id="272" r:id="rId14"/>
-    <p:sldId id="286" r:id="rId15"/>
-    <p:sldId id="287" r:id="rId16"/>
+    <p:sldId id="267" r:id="rId12"/>
+    <p:sldId id="272" r:id="rId13"/>
+    <p:sldId id="286" r:id="rId14"/>
+    <p:sldId id="287" r:id="rId15"/>
+    <p:sldId id="285" r:id="rId16"/>
     <p:sldId id="288" r:id="rId17"/>
     <p:sldId id="261" r:id="rId18"/>
     <p:sldId id="269" r:id="rId19"/>
@@ -226,7 +226,7 @@
           <a:p>
             <a:fld id="{9F3E5AB5-D5FD-0845-9CB2-99DF1E920971}" type="datetimeFigureOut">
               <a:rPr lang="en-US" smtClean="0"/>
-              <a:t>6/16/20</a:t>
+              <a:t>6/17/2020</a:t>
             </a:fld>
             <a:endParaRPr lang="en-US"/>
           </a:p>
@@ -6394,10 +6394,144 @@
       </p:grpSpPr>
       <p:sp>
         <p:nvSpPr>
+          <p:cNvPr id="3" name="Title 2">
+            <a:extLst>
+              <a:ext uri="{FF2B5EF4-FFF2-40B4-BE49-F238E27FC236}">
+                <a16:creationId xmlns:a16="http://schemas.microsoft.com/office/drawing/2014/main" id="{719FC9C6-AFC1-8C40-B9EF-0514AFC2185A}"/>
+              </a:ext>
+            </a:extLst>
+          </p:cNvPr>
+          <p:cNvSpPr>
+            <a:spLocks noGrp="1"/>
+          </p:cNvSpPr>
+          <p:nvPr>
+            <p:ph type="title"/>
+          </p:nvPr>
+        </p:nvSpPr>
+        <p:spPr>
+          <a:xfrm>
+            <a:off x="1087392" y="242678"/>
+            <a:ext cx="10017215" cy="716260"/>
+          </a:xfrm>
+        </p:spPr>
+        <p:txBody>
+          <a:bodyPr/>
+          <a:lstStyle/>
+          <a:p>
+            <a:r>
+              <a:rPr lang="en-CA" dirty="0"/>
+              <a:t>Data Science Techniques</a:t>
+            </a:r>
+            <a:r>
+              <a:rPr lang="en-US" dirty="0"/>
+              <a:t>: Evaluation Metrics</a:t>
+            </a:r>
+          </a:p>
+        </p:txBody>
+      </p:sp>
+      <p:sp>
+        <p:nvSpPr>
+          <p:cNvPr id="4" name="Content Placeholder 3">
+            <a:extLst>
+              <a:ext uri="{FF2B5EF4-FFF2-40B4-BE49-F238E27FC236}">
+                <a16:creationId xmlns:a16="http://schemas.microsoft.com/office/drawing/2014/main" id="{6E8D4644-885D-E047-A58E-C9F4819C407C}"/>
+              </a:ext>
+            </a:extLst>
+          </p:cNvPr>
+          <p:cNvSpPr>
+            <a:spLocks noGrp="1"/>
+          </p:cNvSpPr>
+          <p:nvPr>
+            <p:ph sz="half" idx="13"/>
+          </p:nvPr>
+        </p:nvSpPr>
+        <p:spPr>
+          <a:xfrm>
+            <a:off x="1087392" y="1372607"/>
+            <a:ext cx="10227537" cy="4351338"/>
+          </a:xfrm>
+        </p:spPr>
+        <p:txBody>
+          <a:bodyPr/>
+          <a:lstStyle/>
+          <a:p>
+            <a:r>
+              <a:rPr lang="en-US" sz="2600" dirty="0"/>
+              <a:t>Total 9 evaluation metrics</a:t>
+            </a:r>
+          </a:p>
+          <a:p>
+            <a:r>
+              <a:rPr lang="en-US" sz="2600" dirty="0"/>
+              <a:t>N-gram based metrics</a:t>
+            </a:r>
+          </a:p>
+          <a:p>
+            <a:pPr lvl="1">
+              <a:buFont typeface="Arial" panose="020B0604020202020204" pitchFamily="34" charset="0"/>
+              <a:buChar char="•"/>
+            </a:pPr>
+            <a:r>
+              <a:rPr lang="en-US" sz="2600" dirty="0"/>
+              <a:t>Bleu 1-4</a:t>
+            </a:r>
+          </a:p>
+          <a:p>
+            <a:pPr lvl="1">
+              <a:buFont typeface="Arial" panose="020B0604020202020204" pitchFamily="34" charset="0"/>
+              <a:buChar char="•"/>
+            </a:pPr>
+            <a:r>
+              <a:rPr lang="en-US" sz="2600" dirty="0"/>
+              <a:t>Rouge L</a:t>
+            </a:r>
+          </a:p>
+          <a:p>
+            <a:pPr lvl="1">
+              <a:buFont typeface="Arial" panose="020B0604020202020204" pitchFamily="34" charset="0"/>
+              <a:buChar char="•"/>
+            </a:pPr>
+            <a:r>
+              <a:rPr lang="en-US" sz="2600" dirty="0" err="1"/>
+              <a:t>Meteror</a:t>
+            </a:r>
+            <a:endParaRPr lang="en-US" sz="2600" dirty="0"/>
+          </a:p>
+          <a:p>
+            <a:pPr lvl="1">
+              <a:buFont typeface="Arial" panose="020B0604020202020204" pitchFamily="34" charset="0"/>
+              <a:buChar char="•"/>
+            </a:pPr>
+            <a:r>
+              <a:rPr lang="en-US" sz="2600" dirty="0" err="1"/>
+              <a:t>CIDEr</a:t>
+            </a:r>
+            <a:endParaRPr lang="en-US" sz="2600" dirty="0"/>
+          </a:p>
+          <a:p>
+            <a:pPr lvl="1">
+              <a:buFont typeface="Arial" panose="020B0604020202020204" pitchFamily="34" charset="0"/>
+              <a:buChar char="•"/>
+            </a:pPr>
+            <a:r>
+              <a:rPr lang="en-US" sz="2600" dirty="0"/>
+              <a:t>Commonly used in the community and research papers</a:t>
+            </a:r>
+          </a:p>
+          <a:p>
+            <a:pPr marL="0" indent="0">
+              <a:buNone/>
+            </a:pPr>
+            <a:endParaRPr lang="en-US" sz="2600" dirty="0"/>
+          </a:p>
+        </p:txBody>
+      </p:sp>
+      <p:sp>
+        <p:nvSpPr>
           <p:cNvPr id="5" name="Footer Placeholder 4">
             <a:extLst>
               <a:ext uri="{FF2B5EF4-FFF2-40B4-BE49-F238E27FC236}">
-                <a16:creationId xmlns:a16="http://schemas.microsoft.com/office/drawing/2014/main" id="{D9C9D3CC-B95D-9541-A8DC-E0FADFB5C819}"/>
+                <a16:creationId xmlns:a16="http://schemas.microsoft.com/office/drawing/2014/main" id="{132D22B5-1708-BF45-994B-6370B8109D37}"/>
               </a:ext>
             </a:extLst>
           </p:cNvPr>
@@ -6431,113 +6565,10 @@
           </a:p>
         </p:txBody>
       </p:sp>
-      <p:sp>
-        <p:nvSpPr>
-          <p:cNvPr id="6" name="Title 1">
-            <a:extLst>
-              <a:ext uri="{FF2B5EF4-FFF2-40B4-BE49-F238E27FC236}">
-                <a16:creationId xmlns:a16="http://schemas.microsoft.com/office/drawing/2014/main" id="{42EC2929-4B37-EB41-8EAE-566B58505BEB}"/>
-              </a:ext>
-            </a:extLst>
-          </p:cNvPr>
-          <p:cNvSpPr>
-            <a:spLocks noGrp="1"/>
-          </p:cNvSpPr>
-          <p:nvPr>
-            <p:ph type="title"/>
-          </p:nvPr>
-        </p:nvSpPr>
-        <p:spPr>
-          <a:xfrm>
-            <a:off x="1178169" y="376848"/>
-            <a:ext cx="10515600" cy="1325563"/>
-          </a:xfrm>
-        </p:spPr>
-        <p:txBody>
-          <a:bodyPr>
-            <a:normAutofit/>
-          </a:bodyPr>
-          <a:lstStyle/>
-          <a:p>
-            <a:r>
-              <a:rPr lang="en-US" sz="3600" b="1" dirty="0"/>
-              <a:t>Transfer Learning vs. Learning from scratch</a:t>
-            </a:r>
-          </a:p>
-        </p:txBody>
-      </p:sp>
-      <p:sp>
-        <p:nvSpPr>
-          <p:cNvPr id="7" name="TextBox 6">
-            <a:extLst>
-              <a:ext uri="{FF2B5EF4-FFF2-40B4-BE49-F238E27FC236}">
-                <a16:creationId xmlns:a16="http://schemas.microsoft.com/office/drawing/2014/main" id="{13809B36-38A7-7148-AD57-CB8286A826A9}"/>
-              </a:ext>
-            </a:extLst>
-          </p:cNvPr>
-          <p:cNvSpPr txBox="1"/>
-          <p:nvPr/>
-        </p:nvSpPr>
-        <p:spPr>
-          <a:xfrm>
-            <a:off x="1178169" y="1702411"/>
-            <a:ext cx="10587111" cy="2893100"/>
-          </a:xfrm>
-          <a:prstGeom prst="rect">
-            <a:avLst/>
-          </a:prstGeom>
-          <a:noFill/>
-        </p:spPr>
-        <p:txBody>
-          <a:bodyPr wrap="square" rtlCol="0">
-            <a:spAutoFit/>
-          </a:bodyPr>
-          <a:lstStyle/>
-          <a:p>
-            <a:pPr marL="342900" indent="-342900">
-              <a:buAutoNum type="arabicPeriod"/>
-            </a:pPr>
-            <a:r>
-              <a:rPr lang="en-US" sz="2600" dirty="0"/>
-              <a:t>Pre-trained CNN model performed better than CNN model learned from scratch</a:t>
-            </a:r>
-          </a:p>
-          <a:p>
-            <a:pPr marL="342900" indent="-342900">
-              <a:buAutoNum type="arabicPeriod"/>
-            </a:pPr>
-            <a:endParaRPr lang="en-US" sz="2600" dirty="0"/>
-          </a:p>
-          <a:p>
-            <a:pPr marL="342900" indent="-342900">
-              <a:buAutoNum type="arabicPeriod"/>
-            </a:pPr>
-            <a:r>
-              <a:rPr lang="en-US" sz="2600" dirty="0"/>
-              <a:t>Pre-trained embeddings weights performed better than embeddings weights learned from scratch</a:t>
-            </a:r>
-          </a:p>
-          <a:p>
-            <a:pPr marL="342900" indent="-342900">
-              <a:buAutoNum type="arabicPeriod"/>
-            </a:pPr>
-            <a:endParaRPr lang="en-US" sz="2600" dirty="0"/>
-          </a:p>
-          <a:p>
-            <a:pPr marL="342900" indent="-342900">
-              <a:buAutoNum type="arabicPeriod"/>
-            </a:pPr>
-            <a:r>
-              <a:rPr lang="en-US" sz="2600" dirty="0"/>
-              <a:t>We decided to use pre-trained CNN model and embeddings weights</a:t>
-            </a:r>
-          </a:p>
-        </p:txBody>
-      </p:sp>
     </p:spTree>
     <p:extLst>
       <p:ext uri="{BB962C8B-B14F-4D97-AF65-F5344CB8AC3E}">
-        <p14:creationId xmlns:p14="http://schemas.microsoft.com/office/powerpoint/2010/main" val="1503655588"/>
+        <p14:creationId xmlns:p14="http://schemas.microsoft.com/office/powerpoint/2010/main" val="4276612545"/>
       </p:ext>
     </p:extLst>
   </p:cSld>
@@ -6569,7 +6600,7 @@
           <p:cNvPr id="3" name="Title 2">
             <a:extLst>
               <a:ext uri="{FF2B5EF4-FFF2-40B4-BE49-F238E27FC236}">
-                <a16:creationId xmlns:a16="http://schemas.microsoft.com/office/drawing/2014/main" id="{719FC9C6-AFC1-8C40-B9EF-0514AFC2185A}"/>
+                <a16:creationId xmlns:a16="http://schemas.microsoft.com/office/drawing/2014/main" id="{080A15B5-E576-B747-B007-A72F3777A4B5}"/>
               </a:ext>
             </a:extLst>
           </p:cNvPr>
@@ -6582,7 +6613,7 @@
         </p:nvSpPr>
         <p:spPr>
           <a:xfrm>
-            <a:off x="1087392" y="242678"/>
+            <a:off x="1112066" y="253978"/>
             <a:ext cx="10017215" cy="716260"/>
           </a:xfrm>
         </p:spPr>
@@ -6596,7 +6627,7 @@
             </a:r>
             <a:r>
               <a:rPr lang="en-US" dirty="0"/>
-              <a:t>: Evaluation Metrics</a:t>
+              <a:t>: : Evaluation Metrics</a:t>
             </a:r>
           </a:p>
         </p:txBody>
@@ -6606,7 +6637,7 @@
           <p:cNvPr id="4" name="Content Placeholder 3">
             <a:extLst>
               <a:ext uri="{FF2B5EF4-FFF2-40B4-BE49-F238E27FC236}">
-                <a16:creationId xmlns:a16="http://schemas.microsoft.com/office/drawing/2014/main" id="{6E8D4644-885D-E047-A58E-C9F4819C407C}"/>
+                <a16:creationId xmlns:a16="http://schemas.microsoft.com/office/drawing/2014/main" id="{208FB8C0-31AA-A248-B300-33329EFE891B}"/>
               </a:ext>
             </a:extLst>
           </p:cNvPr>
@@ -6619,8 +6650,8 @@
         </p:nvSpPr>
         <p:spPr>
           <a:xfrm>
-            <a:off x="1087392" y="1372607"/>
-            <a:ext cx="10227537" cy="4351338"/>
+            <a:off x="1112066" y="1511695"/>
+            <a:ext cx="7070642" cy="4351338"/>
           </a:xfrm>
         </p:spPr>
         <p:txBody>
@@ -6629,13 +6660,7 @@
           <a:p>
             <a:r>
               <a:rPr lang="en-US" sz="2600" dirty="0"/>
-              <a:t>Total 9 evaluation metrics</a:t>
-            </a:r>
-          </a:p>
-          <a:p>
-            <a:r>
-              <a:rPr lang="en-US" sz="2600" dirty="0"/>
-              <a:t>N-gram based metrics</a:t>
+              <a:t>Semantic-based metrics: </a:t>
             </a:r>
           </a:p>
           <a:p>
@@ -6645,7 +6670,15 @@
             </a:pPr>
             <a:r>
               <a:rPr lang="en-US" sz="2600" dirty="0"/>
-              <a:t>Bleu 1-4</a:t>
+              <a:t>SPICE: </a:t>
+            </a:r>
+            <a:r>
+              <a:rPr lang="en-CA" sz="2600" dirty="0"/>
+              <a:t>semantic </a:t>
+            </a:r>
+            <a:r>
+              <a:rPr lang="en-US" sz="2600" dirty="0"/>
+              <a:t>scene graph</a:t>
             </a:r>
           </a:p>
           <a:p>
@@ -6655,46 +6688,11 @@
             </a:pPr>
             <a:r>
               <a:rPr lang="en-US" sz="2600" dirty="0"/>
-              <a:t>Rouge L</a:t>
-            </a:r>
-          </a:p>
-          <a:p>
-            <a:pPr lvl="1">
-              <a:buFont typeface="Arial" panose="020B0604020202020204" pitchFamily="34" charset="0"/>
-              <a:buChar char="•"/>
-            </a:pPr>
-            <a:r>
-              <a:rPr lang="en-US" sz="2600" dirty="0" err="1"/>
-              <a:t>Meteror</a:t>
-            </a:r>
-            <a:endParaRPr lang="en-US" sz="2600" dirty="0"/>
-          </a:p>
-          <a:p>
-            <a:pPr lvl="1">
-              <a:buFont typeface="Arial" panose="020B0604020202020204" pitchFamily="34" charset="0"/>
-              <a:buChar char="•"/>
-            </a:pPr>
-            <a:r>
-              <a:rPr lang="en-US" sz="2600" dirty="0" err="1"/>
-              <a:t>CIDEr</a:t>
-            </a:r>
-            <a:endParaRPr lang="en-US" sz="2600" dirty="0"/>
-          </a:p>
-          <a:p>
-            <a:pPr lvl="1">
-              <a:buFont typeface="Arial" panose="020B0604020202020204" pitchFamily="34" charset="0"/>
-              <a:buChar char="•"/>
-            </a:pPr>
-            <a:r>
-              <a:rPr lang="en-US" sz="2600" dirty="0"/>
-              <a:t>Commonly used in the community and research papers</a:t>
-            </a:r>
-          </a:p>
-          <a:p>
-            <a:pPr marL="0" indent="0">
-              <a:buNone/>
-            </a:pPr>
-            <a:endParaRPr lang="en-US" sz="2600" dirty="0"/>
+              <a:t>Universal Sentence Encoder Similarity</a:t>
+            </a:r>
+          </a:p>
+          <a:p>
+            <a:endParaRPr lang="en-US" dirty="0"/>
           </a:p>
         </p:txBody>
       </p:sp>
@@ -6703,7 +6701,7 @@
           <p:cNvPr id="5" name="Footer Placeholder 4">
             <a:extLst>
               <a:ext uri="{FF2B5EF4-FFF2-40B4-BE49-F238E27FC236}">
-                <a16:creationId xmlns:a16="http://schemas.microsoft.com/office/drawing/2014/main" id="{132D22B5-1708-BF45-994B-6370B8109D37}"/>
+                <a16:creationId xmlns:a16="http://schemas.microsoft.com/office/drawing/2014/main" id="{27546011-A305-C840-80B3-181DE9DE0892}"/>
               </a:ext>
             </a:extLst>
           </p:cNvPr>
@@ -6737,10 +6735,40 @@
           </a:p>
         </p:txBody>
       </p:sp>
+      <p:pic>
+        <p:nvPicPr>
+          <p:cNvPr id="6" name="Picture 5">
+            <a:extLst>
+              <a:ext uri="{FF2B5EF4-FFF2-40B4-BE49-F238E27FC236}">
+                <a16:creationId xmlns:a16="http://schemas.microsoft.com/office/drawing/2014/main" id="{CC009A8B-C648-5645-862D-E70E3D599938}"/>
+              </a:ext>
+            </a:extLst>
+          </p:cNvPr>
+          <p:cNvPicPr>
+            <a:picLocks noChangeAspect="1"/>
+          </p:cNvPicPr>
+          <p:nvPr/>
+        </p:nvPicPr>
+        <p:blipFill>
+          <a:blip r:embed="rId2"/>
+          <a:stretch>
+            <a:fillRect/>
+          </a:stretch>
+        </p:blipFill>
+        <p:spPr>
+          <a:xfrm>
+            <a:off x="3093677" y="2933362"/>
+            <a:ext cx="5397500" cy="3200400"/>
+          </a:xfrm>
+          <a:prstGeom prst="rect">
+            <a:avLst/>
+          </a:prstGeom>
+        </p:spPr>
+      </p:pic>
     </p:spTree>
     <p:extLst>
       <p:ext uri="{BB962C8B-B14F-4D97-AF65-F5344CB8AC3E}">
-        <p14:creationId xmlns:p14="http://schemas.microsoft.com/office/powerpoint/2010/main" val="4276612545"/>
+        <p14:creationId xmlns:p14="http://schemas.microsoft.com/office/powerpoint/2010/main" val="3996265033"/>
       </p:ext>
     </p:extLst>
   </p:cSld>
@@ -6769,10 +6797,49 @@
       </p:grpSpPr>
       <p:sp>
         <p:nvSpPr>
-          <p:cNvPr id="3" name="Title 2">
+          <p:cNvPr id="5" name="Footer Placeholder 4">
             <a:extLst>
               <a:ext uri="{FF2B5EF4-FFF2-40B4-BE49-F238E27FC236}">
-                <a16:creationId xmlns:a16="http://schemas.microsoft.com/office/drawing/2014/main" id="{080A15B5-E576-B747-B007-A72F3777A4B5}"/>
+                <a16:creationId xmlns:a16="http://schemas.microsoft.com/office/drawing/2014/main" id="{F94F5839-A6D2-7543-8A13-3BFB41744AD3}"/>
+              </a:ext>
+            </a:extLst>
+          </p:cNvPr>
+          <p:cNvSpPr>
+            <a:spLocks noGrp="1"/>
+          </p:cNvSpPr>
+          <p:nvPr>
+            <p:ph type="ftr" sz="quarter" idx="3"/>
+          </p:nvPr>
+        </p:nvSpPr>
+        <p:spPr/>
+        <p:txBody>
+          <a:bodyPr/>
+          <a:lstStyle/>
+          <a:p>
+            <a:r>
+              <a:rPr lang="en-US"/>
+              <a:t>Use, duplication or disclosure of this document or any of the information or images contained herein is subject to the restrictions on the title page of this document. </a:t>
+            </a:r>
+          </a:p>
+          <a:p>
+            <a:r>
+              <a:rPr lang="en-US"/>
+              <a:t>COPYRIGHT ©2020 </a:t>
+            </a:r>
+            <a:r>
+              <a:rPr lang="en-CA"/>
+              <a:t>MacDonald, Dettwiler and Associates Inc. (MDA). </a:t>
+            </a:r>
+            <a:endParaRPr lang="en-US" dirty="0"/>
+          </a:p>
+        </p:txBody>
+      </p:sp>
+      <p:sp>
+        <p:nvSpPr>
+          <p:cNvPr id="6" name="Title 1">
+            <a:extLst>
+              <a:ext uri="{FF2B5EF4-FFF2-40B4-BE49-F238E27FC236}">
+                <a16:creationId xmlns:a16="http://schemas.microsoft.com/office/drawing/2014/main" id="{F5FCF839-E946-F947-A45B-E2477889AF90}"/>
               </a:ext>
             </a:extLst>
           </p:cNvPr>
@@ -6785,8 +6852,8 @@
         </p:nvSpPr>
         <p:spPr>
           <a:xfrm>
-            <a:off x="1112066" y="253978"/>
-            <a:ext cx="10017215" cy="716260"/>
+            <a:off x="1051564" y="243934"/>
+            <a:ext cx="11140436" cy="1325563"/>
           </a:xfrm>
         </p:spPr>
         <p:txBody>
@@ -6794,125 +6861,83 @@
           <a:lstStyle/>
           <a:p>
             <a:r>
-              <a:rPr lang="en-CA" dirty="0"/>
-              <a:t>Data Science Techniques</a:t>
-            </a:r>
-            <a:r>
-              <a:rPr lang="en-US" dirty="0"/>
-              <a:t>: : Evaluation Metrics</a:t>
-            </a:r>
-          </a:p>
-        </p:txBody>
-      </p:sp>
-      <p:sp>
-        <p:nvSpPr>
-          <p:cNvPr id="4" name="Content Placeholder 3">
+              <a:rPr lang="en-US" sz="3600" b="1" dirty="0">
+                <a:solidFill>
+                  <a:prstClr val="black"/>
+                </a:solidFill>
+              </a:rPr>
+              <a:t>Evaluation scores from the best model of each structure</a:t>
+            </a:r>
+            <a:endParaRPr lang="en-US" dirty="0"/>
+          </a:p>
+        </p:txBody>
+      </p:sp>
+      <p:sp>
+        <p:nvSpPr>
+          <p:cNvPr id="7" name="TextBox 6">
             <a:extLst>
               <a:ext uri="{FF2B5EF4-FFF2-40B4-BE49-F238E27FC236}">
-                <a16:creationId xmlns:a16="http://schemas.microsoft.com/office/drawing/2014/main" id="{208FB8C0-31AA-A248-B300-33329EFE891B}"/>
+                <a16:creationId xmlns:a16="http://schemas.microsoft.com/office/drawing/2014/main" id="{54D06011-37BF-AC43-BD71-59304B71C804}"/>
               </a:ext>
             </a:extLst>
           </p:cNvPr>
-          <p:cNvSpPr>
-            <a:spLocks noGrp="1"/>
-          </p:cNvSpPr>
-          <p:nvPr>
-            <p:ph sz="half" idx="13"/>
-          </p:nvPr>
-        </p:nvSpPr>
-        <p:spPr>
-          <a:xfrm>
-            <a:off x="1112066" y="1511695"/>
-            <a:ext cx="7070642" cy="4351338"/>
-          </a:xfrm>
-        </p:spPr>
-        <p:txBody>
-          <a:bodyPr/>
+          <p:cNvSpPr txBox="1"/>
+          <p:nvPr/>
+        </p:nvSpPr>
+        <p:spPr>
+          <a:xfrm>
+            <a:off x="575980" y="1546168"/>
+            <a:ext cx="4615452" cy="2492990"/>
+          </a:xfrm>
+          <a:prstGeom prst="rect">
+            <a:avLst/>
+          </a:prstGeom>
+          <a:noFill/>
+        </p:spPr>
+        <p:txBody>
+          <a:bodyPr wrap="square" rtlCol="0">
+            <a:spAutoFit/>
+          </a:bodyPr>
           <a:lstStyle/>
           <a:p>
-            <a:r>
-              <a:rPr lang="en-US" sz="2600" dirty="0"/>
-              <a:t>Semantic-based metrics: </a:t>
-            </a:r>
-          </a:p>
-          <a:p>
-            <a:pPr lvl="1">
+            <a:pPr marL="457200" indent="-457200">
               <a:buFont typeface="Arial" panose="020B0604020202020204" pitchFamily="34" charset="0"/>
               <a:buChar char="•"/>
             </a:pPr>
             <a:r>
               <a:rPr lang="en-US" sz="2600" dirty="0"/>
-              <a:t>SPICE: </a:t>
-            </a:r>
-            <a:r>
-              <a:rPr lang="en-CA" sz="2600" dirty="0"/>
-              <a:t>semantic </a:t>
+              <a:t>Test data and train data are from the </a:t>
+            </a:r>
+            <a:r>
+              <a:rPr lang="en-US" sz="2600" b="1" dirty="0"/>
+              <a:t>same</a:t>
             </a:r>
             <a:r>
               <a:rPr lang="en-US" sz="2600" dirty="0"/>
-              <a:t>scene graph</a:t>
-            </a:r>
-          </a:p>
-          <a:p>
-            <a:pPr lvl="1">
+              <a:t> datasets</a:t>
+            </a:r>
+          </a:p>
+          <a:p>
+            <a:endParaRPr lang="en-US" sz="2600" dirty="0"/>
+          </a:p>
+          <a:p>
+            <a:pPr marL="457200" indent="-457200">
               <a:buFont typeface="Arial" panose="020B0604020202020204" pitchFamily="34" charset="0"/>
               <a:buChar char="•"/>
             </a:pPr>
             <a:r>
               <a:rPr lang="en-US" sz="2600" dirty="0"/>
-              <a:t>Universal Sentence Encoder Similarity</a:t>
-            </a:r>
-          </a:p>
-          <a:p>
-            <a:endParaRPr lang="en-US" dirty="0"/>
-          </a:p>
-        </p:txBody>
-      </p:sp>
-      <p:sp>
-        <p:nvSpPr>
-          <p:cNvPr id="5" name="Footer Placeholder 4">
+              <a:t>BLEU 1 and ROUGE L scores range from 0.5 to 0.8 on the  baseline in literatures</a:t>
+            </a:r>
+          </a:p>
+        </p:txBody>
+      </p:sp>
+      <p:pic>
+        <p:nvPicPr>
+          <p:cNvPr id="9" name="Picture 8">
             <a:extLst>
               <a:ext uri="{FF2B5EF4-FFF2-40B4-BE49-F238E27FC236}">
-                <a16:creationId xmlns:a16="http://schemas.microsoft.com/office/drawing/2014/main" id="{27546011-A305-C840-80B3-181DE9DE0892}"/>
-              </a:ext>
-            </a:extLst>
-          </p:cNvPr>
-          <p:cNvSpPr>
-            <a:spLocks noGrp="1"/>
-          </p:cNvSpPr>
-          <p:nvPr>
-            <p:ph type="ftr" sz="quarter" idx="3"/>
-          </p:nvPr>
-        </p:nvSpPr>
-        <p:spPr/>
-        <p:txBody>
-          <a:bodyPr/>
-          <a:lstStyle/>
-          <a:p>
-            <a:r>
-              <a:rPr lang="en-US"/>
-              <a:t>Use, duplication or disclosure of this document or any of the information or images contained herein is subject to the restrictions on the title page of this document. </a:t>
-            </a:r>
-          </a:p>
-          <a:p>
-            <a:r>
-              <a:rPr lang="en-US"/>
-              <a:t>COPYRIGHT ©2020 </a:t>
-            </a:r>
-            <a:r>
-              <a:rPr lang="en-CA"/>
-              <a:t>MacDonald, Dettwiler and Associates Inc. (MDA). </a:t>
-            </a:r>
-            <a:endParaRPr lang="en-US" dirty="0"/>
-          </a:p>
-        </p:txBody>
-      </p:sp>
-      <p:pic>
-        <p:nvPicPr>
-          <p:cNvPr id="6" name="Picture 5">
-            <a:extLst>
-              <a:ext uri="{FF2B5EF4-FFF2-40B4-BE49-F238E27FC236}">
-                <a16:creationId xmlns:a16="http://schemas.microsoft.com/office/drawing/2014/main" id="{CC009A8B-C648-5645-862D-E70E3D599938}"/>
+                <a16:creationId xmlns:a16="http://schemas.microsoft.com/office/drawing/2014/main" id="{AC90C3CF-D4EF-488A-932B-D5389BBB9605}"/>
               </a:ext>
             </a:extLst>
           </p:cNvPr>
@@ -6929,8 +6954,8 @@
         </p:blipFill>
         <p:spPr>
           <a:xfrm>
-            <a:off x="3093677" y="2933362"/>
-            <a:ext cx="5397500" cy="3200400"/>
+            <a:off x="5114055" y="1620772"/>
+            <a:ext cx="6749319" cy="4138849"/>
           </a:xfrm>
           <a:prstGeom prst="rect">
             <a:avLst/>
@@ -6940,7 +6965,7 @@
     </p:spTree>
     <p:extLst>
       <p:ext uri="{BB962C8B-B14F-4D97-AF65-F5344CB8AC3E}">
-        <p14:creationId xmlns:p14="http://schemas.microsoft.com/office/powerpoint/2010/main" val="3996265033"/>
+        <p14:creationId xmlns:p14="http://schemas.microsoft.com/office/powerpoint/2010/main" val="1676487083"/>
       </p:ext>
     </p:extLst>
   </p:cSld>
@@ -6972,7 +6997,7 @@
           <p:cNvPr id="5" name="Footer Placeholder 4">
             <a:extLst>
               <a:ext uri="{FF2B5EF4-FFF2-40B4-BE49-F238E27FC236}">
-                <a16:creationId xmlns:a16="http://schemas.microsoft.com/office/drawing/2014/main" id="{F94F5839-A6D2-7543-8A13-3BFB41744AD3}"/>
+                <a16:creationId xmlns:a16="http://schemas.microsoft.com/office/drawing/2014/main" id="{4588D238-E86C-4146-AB2A-0834022F788A}"/>
               </a:ext>
             </a:extLst>
           </p:cNvPr>
@@ -7011,7 +7036,7 @@
           <p:cNvPr id="6" name="Title 1">
             <a:extLst>
               <a:ext uri="{FF2B5EF4-FFF2-40B4-BE49-F238E27FC236}">
-                <a16:creationId xmlns:a16="http://schemas.microsoft.com/office/drawing/2014/main" id="{F5FCF839-E946-F947-A45B-E2477889AF90}"/>
+                <a16:creationId xmlns:a16="http://schemas.microsoft.com/office/drawing/2014/main" id="{79AD9F70-3C92-FC44-916B-D40CEEAA523D}"/>
               </a:ext>
             </a:extLst>
           </p:cNvPr>
@@ -7024,12 +7049,14 @@
         </p:nvSpPr>
         <p:spPr>
           <a:xfrm>
-            <a:off x="1051564" y="243934"/>
-            <a:ext cx="11140436" cy="1325563"/>
-          </a:xfrm>
-        </p:spPr>
-        <p:txBody>
-          <a:bodyPr/>
+            <a:off x="1121312" y="330045"/>
+            <a:ext cx="11005916" cy="1325563"/>
+          </a:xfrm>
+        </p:spPr>
+        <p:txBody>
+          <a:bodyPr>
+            <a:normAutofit/>
+          </a:bodyPr>
           <a:lstStyle/>
           <a:p>
             <a:r>
@@ -7040,7 +7067,7 @@
               </a:rPr>
               <a:t>Evaluation scores from the best model of each structure</a:t>
             </a:r>
-            <a:endParaRPr lang="en-US" dirty="0"/>
+            <a:endParaRPr lang="en-US" sz="3600" b="1" dirty="0"/>
           </a:p>
         </p:txBody>
       </p:sp>
@@ -7049,7 +7076,7 @@
           <p:cNvPr id="7" name="TextBox 6">
             <a:extLst>
               <a:ext uri="{FF2B5EF4-FFF2-40B4-BE49-F238E27FC236}">
-                <a16:creationId xmlns:a16="http://schemas.microsoft.com/office/drawing/2014/main" id="{54D06011-37BF-AC43-BD71-59304B71C804}"/>
+                <a16:creationId xmlns:a16="http://schemas.microsoft.com/office/drawing/2014/main" id="{F1B81E3C-A6FF-4346-92A6-F2077641832B}"/>
               </a:ext>
             </a:extLst>
           </p:cNvPr>
@@ -7058,8 +7085,8 @@
         </p:nvSpPr>
         <p:spPr>
           <a:xfrm>
-            <a:off x="1051564" y="1511780"/>
-            <a:ext cx="7161512" cy="492443"/>
+            <a:off x="804223" y="2481147"/>
+            <a:ext cx="4382161" cy="892552"/>
           </a:xfrm>
           <a:prstGeom prst="rect">
             <a:avLst/>
@@ -7067,1010 +7094,95 @@
           <a:noFill/>
         </p:spPr>
         <p:txBody>
+          <a:bodyPr wrap="square" rtlCol="0">
+            <a:spAutoFit/>
+          </a:bodyPr>
+          <a:lstStyle/>
+          <a:p>
+            <a:r>
+              <a:rPr lang="en-US" sz="2600" dirty="0"/>
+              <a:t>Test data and train data are from </a:t>
+            </a:r>
+            <a:r>
+              <a:rPr lang="en-US" sz="2600" b="1" dirty="0"/>
+              <a:t>different</a:t>
+            </a:r>
+            <a:r>
+              <a:rPr lang="en-US" sz="2600" dirty="0"/>
+              <a:t> datasets</a:t>
+            </a:r>
+          </a:p>
+        </p:txBody>
+      </p:sp>
+      <p:sp>
+        <p:nvSpPr>
+          <p:cNvPr id="8" name="TextBox 7">
+            <a:extLst>
+              <a:ext uri="{FF2B5EF4-FFF2-40B4-BE49-F238E27FC236}">
+                <a16:creationId xmlns:a16="http://schemas.microsoft.com/office/drawing/2014/main" id="{13AC1009-D7F3-E74B-8E01-EC694A547454}"/>
+              </a:ext>
+            </a:extLst>
+          </p:cNvPr>
+          <p:cNvSpPr txBox="1"/>
+          <p:nvPr/>
+        </p:nvSpPr>
+        <p:spPr>
+          <a:xfrm>
+            <a:off x="804223" y="1730485"/>
+            <a:ext cx="4221990" cy="492443"/>
+          </a:xfrm>
+          <a:prstGeom prst="rect">
+            <a:avLst/>
+          </a:prstGeom>
+          <a:noFill/>
+        </p:spPr>
+        <p:txBody>
           <a:bodyPr wrap="none" rtlCol="0">
             <a:spAutoFit/>
           </a:bodyPr>
           <a:lstStyle/>
           <a:p>
             <a:r>
-              <a:rPr lang="en-US" sz="2600" dirty="0"/>
-              <a:t>Test data and train data are from the </a:t>
-            </a:r>
-            <a:r>
               <a:rPr lang="en-US" sz="2600" b="1" dirty="0"/>
-              <a:t>same</a:t>
-            </a:r>
-            <a:r>
-              <a:rPr lang="en-US" sz="2600" dirty="0"/>
-              <a:t> datasets</a:t>
-            </a:r>
-          </a:p>
-        </p:txBody>
-      </p:sp>
-      <p:graphicFrame>
-        <p:nvGraphicFramePr>
-          <p:cNvPr id="8" name="Table 3">
+              <a:t>Testing Model Generalization</a:t>
+            </a:r>
+          </a:p>
+        </p:txBody>
+      </p:sp>
+      <p:pic>
+        <p:nvPicPr>
+          <p:cNvPr id="10" name="Picture 9">
             <a:extLst>
               <a:ext uri="{FF2B5EF4-FFF2-40B4-BE49-F238E27FC236}">
-                <a16:creationId xmlns:a16="http://schemas.microsoft.com/office/drawing/2014/main" id="{D79F06D4-59CF-F941-B91D-2B3B3D6EF48B}"/>
+                <a16:creationId xmlns:a16="http://schemas.microsoft.com/office/drawing/2014/main" id="{70C88513-638D-4C4B-88E7-D3E2CA46499E}"/>
               </a:ext>
             </a:extLst>
           </p:cNvPr>
-          <p:cNvGraphicFramePr>
-            <a:graphicFrameLocks noGrp="1"/>
-          </p:cNvGraphicFramePr>
-          <p:nvPr>
-            <p:extLst>
-              <p:ext uri="{D42A27DB-BD31-4B8C-83A1-F6EECF244321}">
-                <p14:modId xmlns:p14="http://schemas.microsoft.com/office/powerpoint/2010/main" val="2656455394"/>
-              </p:ext>
-            </p:extLst>
-          </p:nvPr>
-        </p:nvGraphicFramePr>
-        <p:xfrm>
-          <a:off x="1051564" y="2309446"/>
-          <a:ext cx="10645144" cy="2733148"/>
-        </p:xfrm>
-        <a:graphic>
-          <a:graphicData uri="http://schemas.openxmlformats.org/drawingml/2006/table">
-            <a:tbl>
-              <a:tblPr firstRow="1" bandRow="1">
-                <a:tableStyleId>{5C22544A-7EE6-4342-B048-85BDC9FD1C3A}</a:tableStyleId>
-              </a:tblPr>
-              <a:tblGrid>
-                <a:gridCol w="1211580">
-                  <a:extLst>
-                    <a:ext uri="{9D8B030D-6E8A-4147-A177-3AD203B41FA5}">
-                      <a16:colId xmlns:a16="http://schemas.microsoft.com/office/drawing/2014/main" val="2078863130"/>
-                    </a:ext>
-                  </a:extLst>
-                </a:gridCol>
-                <a:gridCol w="845820">
-                  <a:extLst>
-                    <a:ext uri="{9D8B030D-6E8A-4147-A177-3AD203B41FA5}">
-                      <a16:colId xmlns:a16="http://schemas.microsoft.com/office/drawing/2014/main" val="3621588296"/>
-                    </a:ext>
-                  </a:extLst>
-                </a:gridCol>
-                <a:gridCol w="906781">
-                  <a:extLst>
-                    <a:ext uri="{9D8B030D-6E8A-4147-A177-3AD203B41FA5}">
-                      <a16:colId xmlns:a16="http://schemas.microsoft.com/office/drawing/2014/main" val="4155945170"/>
-                    </a:ext>
-                  </a:extLst>
-                </a:gridCol>
-                <a:gridCol w="906780">
-                  <a:extLst>
-                    <a:ext uri="{9D8B030D-6E8A-4147-A177-3AD203B41FA5}">
-                      <a16:colId xmlns:a16="http://schemas.microsoft.com/office/drawing/2014/main" val="993797696"/>
-                    </a:ext>
-                  </a:extLst>
-                </a:gridCol>
-                <a:gridCol w="876301">
-                  <a:extLst>
-                    <a:ext uri="{9D8B030D-6E8A-4147-A177-3AD203B41FA5}">
-                      <a16:colId xmlns:a16="http://schemas.microsoft.com/office/drawing/2014/main" val="1765691710"/>
-                    </a:ext>
-                  </a:extLst>
-                </a:gridCol>
-                <a:gridCol w="1150620">
-                  <a:extLst>
-                    <a:ext uri="{9D8B030D-6E8A-4147-A177-3AD203B41FA5}">
-                      <a16:colId xmlns:a16="http://schemas.microsoft.com/office/drawing/2014/main" val="1250124610"/>
-                    </a:ext>
-                  </a:extLst>
-                </a:gridCol>
-                <a:gridCol w="1150621">
-                  <a:extLst>
-                    <a:ext uri="{9D8B030D-6E8A-4147-A177-3AD203B41FA5}">
-                      <a16:colId xmlns:a16="http://schemas.microsoft.com/office/drawing/2014/main" val="2692160144"/>
-                    </a:ext>
-                  </a:extLst>
-                </a:gridCol>
-                <a:gridCol w="952501">
-                  <a:extLst>
-                    <a:ext uri="{9D8B030D-6E8A-4147-A177-3AD203B41FA5}">
-                      <a16:colId xmlns:a16="http://schemas.microsoft.com/office/drawing/2014/main" val="1671396394"/>
-                    </a:ext>
-                  </a:extLst>
-                </a:gridCol>
-                <a:gridCol w="914400">
-                  <a:extLst>
-                    <a:ext uri="{9D8B030D-6E8A-4147-A177-3AD203B41FA5}">
-                      <a16:colId xmlns:a16="http://schemas.microsoft.com/office/drawing/2014/main" val="707221176"/>
-                    </a:ext>
-                  </a:extLst>
-                </a:gridCol>
-                <a:gridCol w="1729740">
-                  <a:extLst>
-                    <a:ext uri="{9D8B030D-6E8A-4147-A177-3AD203B41FA5}">
-                      <a16:colId xmlns:a16="http://schemas.microsoft.com/office/drawing/2014/main" val="3156725575"/>
-                    </a:ext>
-                  </a:extLst>
-                </a:gridCol>
-              </a:tblGrid>
-              <a:tr h="611367">
-                <a:tc>
-                  <a:txBody>
-                    <a:bodyPr/>
-                    <a:lstStyle/>
-                    <a:p>
-                      <a:pPr algn="l" fontAlgn="ctr"/>
-                      <a:endParaRPr lang="en-US" sz="2000" b="1" dirty="0">
-                        <a:effectLst/>
-                      </a:endParaRPr>
-                    </a:p>
-                  </a:txBody>
-                  <a:tcPr marL="21771" marR="21771" marT="21771" marB="21771" anchor="ctr"/>
-                </a:tc>
-                <a:tc gridSpan="7">
-                  <a:txBody>
-                    <a:bodyPr/>
-                    <a:lstStyle/>
-                    <a:p>
-                      <a:pPr algn="ctr" fontAlgn="ctr"/>
-                      <a:r>
-                        <a:rPr lang="en-US" sz="2000" dirty="0">
-                          <a:effectLst/>
-                        </a:rPr>
-                        <a:t>n-gram Comparison Evaluation</a:t>
-                      </a:r>
-                      <a:endParaRPr lang="en-US" sz="2000" b="1" dirty="0">
-                        <a:effectLst/>
-                      </a:endParaRPr>
-                    </a:p>
-                  </a:txBody>
-                  <a:tcPr marL="21771" marR="21771" marT="21771" marB="21771" anchor="ctr"/>
-                </a:tc>
-                <a:tc hMerge="1">
-                  <a:txBody>
-                    <a:bodyPr/>
-                    <a:lstStyle/>
-                    <a:p>
-                      <a:pPr algn="l" fontAlgn="ctr"/>
-                      <a:endParaRPr lang="en-US" b="1" dirty="0">
-                        <a:effectLst/>
-                      </a:endParaRPr>
-                    </a:p>
-                  </a:txBody>
-                  <a:tcPr marL="21771" marR="21771" marT="21771" marB="21771" anchor="ctr"/>
-                </a:tc>
-                <a:tc hMerge="1">
-                  <a:txBody>
-                    <a:bodyPr/>
-                    <a:lstStyle/>
-                    <a:p>
-                      <a:pPr algn="l" fontAlgn="ctr"/>
-                      <a:endParaRPr lang="en-US" b="1" dirty="0">
-                        <a:effectLst/>
-                      </a:endParaRPr>
-                    </a:p>
-                  </a:txBody>
-                  <a:tcPr marL="21771" marR="21771" marT="21771" marB="21771" anchor="ctr"/>
-                </a:tc>
-                <a:tc hMerge="1">
-                  <a:txBody>
-                    <a:bodyPr/>
-                    <a:lstStyle/>
-                    <a:p>
-                      <a:pPr algn="l" fontAlgn="ctr"/>
-                      <a:endParaRPr lang="en-US" b="1" dirty="0">
-                        <a:effectLst/>
-                      </a:endParaRPr>
-                    </a:p>
-                  </a:txBody>
-                  <a:tcPr marL="21771" marR="21771" marT="21771" marB="21771" anchor="ctr"/>
-                </a:tc>
-                <a:tc hMerge="1">
-                  <a:txBody>
-                    <a:bodyPr/>
-                    <a:lstStyle/>
-                    <a:p>
-                      <a:pPr algn="l" fontAlgn="ctr"/>
-                      <a:endParaRPr lang="en-US" b="1" dirty="0">
-                        <a:effectLst/>
-                      </a:endParaRPr>
-                    </a:p>
-                  </a:txBody>
-                  <a:tcPr marL="21771" marR="21771" marT="21771" marB="21771" anchor="ctr"/>
-                </a:tc>
-                <a:tc hMerge="1">
-                  <a:txBody>
-                    <a:bodyPr/>
-                    <a:lstStyle/>
-                    <a:p>
-                      <a:pPr algn="l" fontAlgn="ctr"/>
-                      <a:endParaRPr lang="en-US" b="1" dirty="0">
-                        <a:effectLst/>
-                      </a:endParaRPr>
-                    </a:p>
-                  </a:txBody>
-                  <a:tcPr marL="21771" marR="21771" marT="21771" marB="21771" anchor="ctr"/>
-                </a:tc>
-                <a:tc hMerge="1">
-                  <a:txBody>
-                    <a:bodyPr/>
-                    <a:lstStyle/>
-                    <a:p>
-                      <a:pPr algn="l" fontAlgn="ctr"/>
-                      <a:endParaRPr lang="en-US" b="1" dirty="0">
-                        <a:effectLst/>
-                      </a:endParaRPr>
-                    </a:p>
-                  </a:txBody>
-                  <a:tcPr marL="21771" marR="21771" marT="21771" marB="21771" anchor="ctr"/>
-                </a:tc>
-                <a:tc gridSpan="2">
-                  <a:txBody>
-                    <a:bodyPr/>
-                    <a:lstStyle/>
-                    <a:p>
-                      <a:pPr algn="ctr" fontAlgn="ctr"/>
-                      <a:r>
-                        <a:rPr lang="en-US" sz="2000" u="none" strike="noStrike" kern="1200" dirty="0">
-                          <a:effectLst/>
-                        </a:rPr>
-                        <a:t>Semantic</a:t>
-                      </a:r>
-                      <a:r>
-                        <a:rPr lang="en-US" sz="2000" dirty="0">
-                          <a:effectLst/>
-                        </a:rPr>
-                        <a:t> Evaluation</a:t>
-                      </a:r>
-                      <a:endParaRPr lang="en-US" sz="2000" b="1" dirty="0">
-                        <a:effectLst/>
-                      </a:endParaRPr>
-                    </a:p>
-                  </a:txBody>
-                  <a:tcPr marL="21771" marR="21771" marT="21771" marB="21771" anchor="ctr"/>
-                </a:tc>
-                <a:tc hMerge="1">
-                  <a:txBody>
-                    <a:bodyPr/>
-                    <a:lstStyle/>
-                    <a:p>
-                      <a:pPr algn="ctr" fontAlgn="ctr"/>
-                      <a:endParaRPr lang="en-US" sz="2000" b="1" dirty="0">
-                        <a:effectLst/>
-                      </a:endParaRPr>
-                    </a:p>
-                  </a:txBody>
-                  <a:tcPr marL="21771" marR="21771" marT="21771" marB="21771" anchor="ctr"/>
-                </a:tc>
-                <a:extLst>
-                  <a:ext uri="{0D108BD9-81ED-4DB2-BD59-A6C34878D82A}">
-                    <a16:rowId xmlns:a16="http://schemas.microsoft.com/office/drawing/2014/main" val="4135081847"/>
-                  </a:ext>
-                </a:extLst>
-              </a:tr>
-              <a:tr h="495656">
-                <a:tc>
-                  <a:txBody>
-                    <a:bodyPr/>
-                    <a:lstStyle/>
-                    <a:p>
-                      <a:pPr algn="ctr" fontAlgn="ctr"/>
-                      <a:r>
-                        <a:rPr lang="en-US" sz="2000" dirty="0">
-                          <a:effectLst/>
-                        </a:rPr>
-                        <a:t>MODEL</a:t>
-                      </a:r>
-                      <a:endParaRPr lang="en-US" sz="2000" b="1" dirty="0">
-                        <a:effectLst/>
-                      </a:endParaRPr>
-                    </a:p>
-                  </a:txBody>
-                  <a:tcPr marL="21771" marR="21771" marT="21771" marB="21771" anchor="ctr"/>
-                </a:tc>
-                <a:tc>
-                  <a:txBody>
-                    <a:bodyPr/>
-                    <a:lstStyle/>
-                    <a:p>
-                      <a:pPr algn="ctr" fontAlgn="ctr"/>
-                      <a:r>
-                        <a:rPr lang="en-US" sz="2000" dirty="0">
-                          <a:effectLst/>
-                        </a:rPr>
-                        <a:t>Bleu 1</a:t>
-                      </a:r>
-                      <a:endParaRPr lang="en-US" sz="2000" b="1" dirty="0">
-                        <a:effectLst/>
-                      </a:endParaRPr>
-                    </a:p>
-                  </a:txBody>
-                  <a:tcPr marL="21771" marR="21771" marT="21771" marB="21771" anchor="ctr"/>
-                </a:tc>
-                <a:tc>
-                  <a:txBody>
-                    <a:bodyPr/>
-                    <a:lstStyle/>
-                    <a:p>
-                      <a:pPr algn="ctr" fontAlgn="ctr"/>
-                      <a:r>
-                        <a:rPr lang="en-US" sz="2000" dirty="0">
-                          <a:effectLst/>
-                        </a:rPr>
-                        <a:t>Bleu 2</a:t>
-                      </a:r>
-                      <a:endParaRPr lang="en-US" sz="2000" b="1" dirty="0">
-                        <a:effectLst/>
-                      </a:endParaRPr>
-                    </a:p>
-                  </a:txBody>
-                  <a:tcPr marL="21771" marR="21771" marT="21771" marB="21771" anchor="ctr"/>
-                </a:tc>
-                <a:tc>
-                  <a:txBody>
-                    <a:bodyPr/>
-                    <a:lstStyle/>
-                    <a:p>
-                      <a:pPr algn="ctr" fontAlgn="ctr"/>
-                      <a:r>
-                        <a:rPr lang="en-US" sz="2000" dirty="0">
-                          <a:effectLst/>
-                        </a:rPr>
-                        <a:t>Bleu 3</a:t>
-                      </a:r>
-                      <a:endParaRPr lang="en-US" sz="2000" b="1" dirty="0">
-                        <a:effectLst/>
-                      </a:endParaRPr>
-                    </a:p>
-                  </a:txBody>
-                  <a:tcPr marL="21771" marR="21771" marT="21771" marB="21771" anchor="ctr"/>
-                </a:tc>
-                <a:tc>
-                  <a:txBody>
-                    <a:bodyPr/>
-                    <a:lstStyle/>
-                    <a:p>
-                      <a:pPr algn="ctr" fontAlgn="ctr"/>
-                      <a:r>
-                        <a:rPr lang="en-US" sz="2000" dirty="0">
-                          <a:effectLst/>
-                        </a:rPr>
-                        <a:t>Bleu 4</a:t>
-                      </a:r>
-                      <a:endParaRPr lang="en-US" sz="2000" b="1" dirty="0">
-                        <a:effectLst/>
-                      </a:endParaRPr>
-                    </a:p>
-                  </a:txBody>
-                  <a:tcPr marL="21771" marR="21771" marT="21771" marB="21771" anchor="ctr"/>
-                </a:tc>
-                <a:tc>
-                  <a:txBody>
-                    <a:bodyPr/>
-                    <a:lstStyle/>
-                    <a:p>
-                      <a:pPr algn="ctr" fontAlgn="ctr"/>
-                      <a:r>
-                        <a:rPr lang="en-US" sz="2000" dirty="0">
-                          <a:effectLst/>
-                        </a:rPr>
-                        <a:t>METEOR</a:t>
-                      </a:r>
-                      <a:endParaRPr lang="en-US" sz="2000" b="1" dirty="0">
-                        <a:effectLst/>
-                      </a:endParaRPr>
-                    </a:p>
-                  </a:txBody>
-                  <a:tcPr marL="21771" marR="21771" marT="21771" marB="21771" anchor="ctr"/>
-                </a:tc>
-                <a:tc>
-                  <a:txBody>
-                    <a:bodyPr/>
-                    <a:lstStyle/>
-                    <a:p>
-                      <a:pPr algn="ctr" fontAlgn="ctr"/>
-                      <a:r>
-                        <a:rPr lang="en-US" sz="2000" dirty="0">
-                          <a:effectLst/>
-                        </a:rPr>
-                        <a:t>ROUGE L</a:t>
-                      </a:r>
-                      <a:endParaRPr lang="en-US" sz="2000" b="1" dirty="0">
-                        <a:effectLst/>
-                      </a:endParaRPr>
-                    </a:p>
-                  </a:txBody>
-                  <a:tcPr marL="21771" marR="21771" marT="21771" marB="21771" anchor="ctr"/>
-                </a:tc>
-                <a:tc>
-                  <a:txBody>
-                    <a:bodyPr/>
-                    <a:lstStyle/>
-                    <a:p>
-                      <a:pPr algn="ctr" fontAlgn="ctr"/>
-                      <a:r>
-                        <a:rPr lang="en-US" sz="2000" dirty="0">
-                          <a:effectLst/>
-                        </a:rPr>
-                        <a:t>CIDEr</a:t>
-                      </a:r>
-                      <a:endParaRPr lang="en-US" sz="2000" b="1" dirty="0">
-                        <a:effectLst/>
-                      </a:endParaRPr>
-                    </a:p>
-                  </a:txBody>
-                  <a:tcPr marL="21771" marR="21771" marT="21771" marB="21771" anchor="ctr"/>
-                </a:tc>
-                <a:tc>
-                  <a:txBody>
-                    <a:bodyPr/>
-                    <a:lstStyle/>
-                    <a:p>
-                      <a:pPr algn="ctr" fontAlgn="ctr"/>
-                      <a:r>
-                        <a:rPr lang="en-US" sz="2000" dirty="0">
-                          <a:effectLst/>
-                        </a:rPr>
-                        <a:t>SPICE</a:t>
-                      </a:r>
-                      <a:endParaRPr lang="en-US" sz="2000" b="1" dirty="0">
-                        <a:effectLst/>
-                      </a:endParaRPr>
-                    </a:p>
-                  </a:txBody>
-                  <a:tcPr marL="21771" marR="21771" marT="21771" marB="21771" anchor="ctr"/>
-                </a:tc>
-                <a:tc>
-                  <a:txBody>
-                    <a:bodyPr/>
-                    <a:lstStyle/>
-                    <a:p>
-                      <a:pPr algn="ctr" fontAlgn="ctr"/>
-                      <a:r>
-                        <a:rPr lang="en-US" sz="2000" dirty="0">
-                          <a:effectLst/>
-                        </a:rPr>
-                        <a:t>USC Similarity</a:t>
-                      </a:r>
-                      <a:endParaRPr lang="en-US" sz="2000" b="1" dirty="0">
-                        <a:effectLst/>
-                      </a:endParaRPr>
-                    </a:p>
-                  </a:txBody>
-                  <a:tcPr marL="21771" marR="21771" marT="21771" marB="21771" anchor="ctr"/>
-                </a:tc>
-                <a:extLst>
-                  <a:ext uri="{0D108BD9-81ED-4DB2-BD59-A6C34878D82A}">
-                    <a16:rowId xmlns:a16="http://schemas.microsoft.com/office/drawing/2014/main" val="2072018098"/>
-                  </a:ext>
-                </a:extLst>
-              </a:tr>
-              <a:tr h="436073">
-                <a:tc>
-                  <a:txBody>
-                    <a:bodyPr/>
-                    <a:lstStyle/>
-                    <a:p>
-                      <a:pPr algn="ctr"/>
-                      <a:r>
-                        <a:rPr lang="en-US" sz="2000" dirty="0"/>
-                        <a:t>Baseline</a:t>
-                      </a:r>
-                    </a:p>
-                  </a:txBody>
-                  <a:tcPr/>
-                </a:tc>
-                <a:tc>
-                  <a:txBody>
-                    <a:bodyPr/>
-                    <a:lstStyle/>
-                    <a:p>
-                      <a:pPr algn="ctr" fontAlgn="ctr"/>
-                      <a:r>
-                        <a:rPr lang="en-US" sz="2000" dirty="0">
-                          <a:effectLst/>
-                        </a:rPr>
-                        <a:t>0.648</a:t>
-                      </a:r>
-                      <a:endParaRPr lang="en-US" sz="2000" b="1" dirty="0">
-                        <a:effectLst/>
-                      </a:endParaRPr>
-                    </a:p>
-                  </a:txBody>
-                  <a:tcPr marL="21771" marR="21771" marT="21771" marB="21771" anchor="ctr"/>
-                </a:tc>
-                <a:tc>
-                  <a:txBody>
-                    <a:bodyPr/>
-                    <a:lstStyle/>
-                    <a:p>
-                      <a:pPr algn="ctr" fontAlgn="ctr"/>
-                      <a:r>
-                        <a:rPr lang="en-US" sz="2000" dirty="0">
-                          <a:effectLst/>
-                        </a:rPr>
-                        <a:t>0.523</a:t>
-                      </a:r>
-                      <a:endParaRPr lang="en-US" sz="2000" b="1" dirty="0">
-                        <a:effectLst/>
-                      </a:endParaRPr>
-                    </a:p>
-                  </a:txBody>
-                  <a:tcPr marL="21771" marR="21771" marT="21771" marB="21771" anchor="ctr"/>
-                </a:tc>
-                <a:tc>
-                  <a:txBody>
-                    <a:bodyPr/>
-                    <a:lstStyle/>
-                    <a:p>
-                      <a:pPr algn="ctr" fontAlgn="ctr"/>
-                      <a:r>
-                        <a:rPr lang="en-US" sz="2000" dirty="0">
-                          <a:effectLst/>
-                        </a:rPr>
-                        <a:t>0.440</a:t>
-                      </a:r>
-                      <a:endParaRPr lang="en-US" sz="2000" b="1" dirty="0">
-                        <a:effectLst/>
-                      </a:endParaRPr>
-                    </a:p>
-                  </a:txBody>
-                  <a:tcPr marL="21771" marR="21771" marT="21771" marB="21771" anchor="ctr"/>
-                </a:tc>
-                <a:tc>
-                  <a:txBody>
-                    <a:bodyPr/>
-                    <a:lstStyle/>
-                    <a:p>
-                      <a:pPr algn="ctr" fontAlgn="ctr"/>
-                      <a:r>
-                        <a:rPr lang="en-US" sz="2000" dirty="0">
-                          <a:effectLst/>
-                        </a:rPr>
-                        <a:t>0.381</a:t>
-                      </a:r>
-                      <a:endParaRPr lang="en-US" sz="2000" b="1" dirty="0">
-                        <a:effectLst/>
-                      </a:endParaRPr>
-                    </a:p>
-                  </a:txBody>
-                  <a:tcPr marL="21771" marR="21771" marT="21771" marB="21771" anchor="ctr"/>
-                </a:tc>
-                <a:tc>
-                  <a:txBody>
-                    <a:bodyPr/>
-                    <a:lstStyle/>
-                    <a:p>
-                      <a:pPr algn="ctr" fontAlgn="ctr"/>
-                      <a:r>
-                        <a:rPr lang="en-US" sz="2000" dirty="0">
-                          <a:effectLst/>
-                        </a:rPr>
-                        <a:t>0.300</a:t>
-                      </a:r>
-                      <a:endParaRPr lang="en-US" sz="2000" b="1" dirty="0">
-                        <a:effectLst/>
-                      </a:endParaRPr>
-                    </a:p>
-                  </a:txBody>
-                  <a:tcPr marL="21771" marR="21771" marT="21771" marB="21771" anchor="ctr"/>
-                </a:tc>
-                <a:tc>
-                  <a:txBody>
-                    <a:bodyPr/>
-                    <a:lstStyle/>
-                    <a:p>
-                      <a:pPr algn="ctr" fontAlgn="ctr"/>
-                      <a:r>
-                        <a:rPr lang="en-US" sz="2000" dirty="0">
-                          <a:effectLst/>
-                        </a:rPr>
-                        <a:t>0.553</a:t>
-                      </a:r>
-                      <a:endParaRPr lang="en-US" sz="2000" b="1" dirty="0">
-                        <a:effectLst/>
-                      </a:endParaRPr>
-                    </a:p>
-                  </a:txBody>
-                  <a:tcPr marL="21771" marR="21771" marT="21771" marB="21771" anchor="ctr"/>
-                </a:tc>
-                <a:tc>
-                  <a:txBody>
-                    <a:bodyPr/>
-                    <a:lstStyle/>
-                    <a:p>
-                      <a:pPr algn="ctr" fontAlgn="ctr"/>
-                      <a:r>
-                        <a:rPr lang="en-US" sz="2000" dirty="0">
-                          <a:effectLst/>
-                        </a:rPr>
-                        <a:t>2.125</a:t>
-                      </a:r>
-                      <a:endParaRPr lang="en-US" sz="2000" b="1" dirty="0">
-                        <a:effectLst/>
-                      </a:endParaRPr>
-                    </a:p>
-                  </a:txBody>
-                  <a:tcPr marL="21771" marR="21771" marT="21771" marB="21771" anchor="ctr"/>
-                </a:tc>
-                <a:tc>
-                  <a:txBody>
-                    <a:bodyPr/>
-                    <a:lstStyle/>
-                    <a:p>
-                      <a:pPr algn="ctr" fontAlgn="ctr"/>
-                      <a:r>
-                        <a:rPr lang="en-US" sz="2000" dirty="0">
-                          <a:effectLst/>
-                        </a:rPr>
-                        <a:t>0.400</a:t>
-                      </a:r>
-                      <a:endParaRPr lang="en-US" sz="2000" b="1" dirty="0">
-                        <a:effectLst/>
-                      </a:endParaRPr>
-                    </a:p>
-                  </a:txBody>
-                  <a:tcPr marL="21771" marR="21771" marT="21771" marB="21771" anchor="ctr"/>
-                </a:tc>
-                <a:tc>
-                  <a:txBody>
-                    <a:bodyPr/>
-                    <a:lstStyle/>
-                    <a:p>
-                      <a:pPr algn="ctr" fontAlgn="ctr"/>
-                      <a:r>
-                        <a:rPr lang="en-US" sz="2000" dirty="0">
-                          <a:effectLst/>
-                        </a:rPr>
-                        <a:t>0.612</a:t>
-                      </a:r>
-                      <a:endParaRPr lang="en-US" sz="2000" b="1" dirty="0">
-                        <a:effectLst/>
-                      </a:endParaRPr>
-                    </a:p>
-                  </a:txBody>
-                  <a:tcPr marL="21771" marR="21771" marT="21771" marB="21771" anchor="ctr"/>
-                </a:tc>
-                <a:extLst>
-                  <a:ext uri="{0D108BD9-81ED-4DB2-BD59-A6C34878D82A}">
-                    <a16:rowId xmlns:a16="http://schemas.microsoft.com/office/drawing/2014/main" val="2426048346"/>
-                  </a:ext>
-                </a:extLst>
-              </a:tr>
-              <a:tr h="489012">
-                <a:tc>
-                  <a:txBody>
-                    <a:bodyPr/>
-                    <a:lstStyle/>
-                    <a:p>
-                      <a:pPr algn="ctr"/>
-                      <a:r>
-                        <a:rPr lang="en-US" sz="2000" dirty="0"/>
-                        <a:t>Attention</a:t>
-                      </a:r>
-                    </a:p>
-                  </a:txBody>
-                  <a:tcPr/>
-                </a:tc>
-                <a:tc>
-                  <a:txBody>
-                    <a:bodyPr/>
-                    <a:lstStyle/>
-                    <a:p>
-                      <a:pPr algn="ctr" fontAlgn="ctr"/>
-                      <a:r>
-                        <a:rPr lang="en-US" sz="2000" dirty="0">
-                          <a:effectLst/>
-                        </a:rPr>
-                        <a:t>0.572</a:t>
-                      </a:r>
-                    </a:p>
-                  </a:txBody>
-                  <a:tcPr marL="21771" marR="21771" marT="21771" marB="21771" anchor="ctr"/>
-                </a:tc>
-                <a:tc>
-                  <a:txBody>
-                    <a:bodyPr/>
-                    <a:lstStyle/>
-                    <a:p>
-                      <a:pPr algn="ctr" fontAlgn="ctr"/>
-                      <a:r>
-                        <a:rPr lang="en-US" sz="2000" dirty="0">
-                          <a:effectLst/>
-                        </a:rPr>
-                        <a:t>0.435</a:t>
-                      </a:r>
-                    </a:p>
-                  </a:txBody>
-                  <a:tcPr marL="21771" marR="21771" marT="21771" marB="21771" anchor="ctr"/>
-                </a:tc>
-                <a:tc>
-                  <a:txBody>
-                    <a:bodyPr/>
-                    <a:lstStyle/>
-                    <a:p>
-                      <a:pPr algn="ctr" fontAlgn="ctr"/>
-                      <a:r>
-                        <a:rPr lang="en-US" sz="2000" dirty="0">
-                          <a:effectLst/>
-                        </a:rPr>
-                        <a:t>0.351</a:t>
-                      </a:r>
-                    </a:p>
-                  </a:txBody>
-                  <a:tcPr marL="21771" marR="21771" marT="21771" marB="21771" anchor="ctr"/>
-                </a:tc>
-                <a:tc>
-                  <a:txBody>
-                    <a:bodyPr/>
-                    <a:lstStyle/>
-                    <a:p>
-                      <a:pPr algn="ctr" fontAlgn="ctr"/>
-                      <a:r>
-                        <a:rPr lang="en-US" sz="2000" dirty="0">
-                          <a:effectLst/>
-                        </a:rPr>
-                        <a:t>0.294</a:t>
-                      </a:r>
-                    </a:p>
-                  </a:txBody>
-                  <a:tcPr marL="21771" marR="21771" marT="21771" marB="21771" anchor="ctr"/>
-                </a:tc>
-                <a:tc>
-                  <a:txBody>
-                    <a:bodyPr/>
-                    <a:lstStyle/>
-                    <a:p>
-                      <a:pPr algn="ctr" fontAlgn="ctr"/>
-                      <a:r>
-                        <a:rPr lang="en-US" sz="2000" dirty="0">
-                          <a:effectLst/>
-                        </a:rPr>
-                        <a:t>0.256</a:t>
-                      </a:r>
-                    </a:p>
-                  </a:txBody>
-                  <a:tcPr marL="21771" marR="21771" marT="21771" marB="21771" anchor="ctr"/>
-                </a:tc>
-                <a:tc>
-                  <a:txBody>
-                    <a:bodyPr/>
-                    <a:lstStyle/>
-                    <a:p>
-                      <a:pPr algn="ctr" fontAlgn="ctr"/>
-                      <a:r>
-                        <a:rPr lang="en-US" sz="2000" dirty="0">
-                          <a:effectLst/>
-                        </a:rPr>
-                        <a:t>0.473</a:t>
-                      </a:r>
-                    </a:p>
-                  </a:txBody>
-                  <a:tcPr marL="21771" marR="21771" marT="21771" marB="21771" anchor="ctr"/>
-                </a:tc>
-                <a:tc>
-                  <a:txBody>
-                    <a:bodyPr/>
-                    <a:lstStyle/>
-                    <a:p>
-                      <a:pPr algn="ctr" fontAlgn="ctr"/>
-                      <a:r>
-                        <a:rPr lang="en-US" sz="2000" dirty="0">
-                          <a:effectLst/>
-                        </a:rPr>
-                        <a:t>1.540</a:t>
-                      </a:r>
-                    </a:p>
-                  </a:txBody>
-                  <a:tcPr marL="21771" marR="21771" marT="21771" marB="21771" anchor="ctr"/>
-                </a:tc>
-                <a:tc>
-                  <a:txBody>
-                    <a:bodyPr/>
-                    <a:lstStyle/>
-                    <a:p>
-                      <a:pPr algn="ctr" fontAlgn="ctr"/>
-                      <a:r>
-                        <a:rPr lang="en-US" sz="2000" dirty="0">
-                          <a:effectLst/>
-                        </a:rPr>
-                        <a:t>0.324</a:t>
-                      </a:r>
-                    </a:p>
-                  </a:txBody>
-                  <a:tcPr marL="21771" marR="21771" marT="21771" marB="21771" anchor="ctr"/>
-                </a:tc>
-                <a:tc>
-                  <a:txBody>
-                    <a:bodyPr/>
-                    <a:lstStyle/>
-                    <a:p>
-                      <a:pPr algn="ctr" fontAlgn="ctr"/>
-                      <a:r>
-                        <a:rPr lang="en-US" sz="2000" dirty="0">
-                          <a:effectLst/>
-                        </a:rPr>
-                        <a:t>0.550</a:t>
-                      </a:r>
-                    </a:p>
-                  </a:txBody>
-                  <a:tcPr marL="21771" marR="21771" marT="21771" marB="21771" anchor="ctr"/>
-                </a:tc>
-                <a:extLst>
-                  <a:ext uri="{0D108BD9-81ED-4DB2-BD59-A6C34878D82A}">
-                    <a16:rowId xmlns:a16="http://schemas.microsoft.com/office/drawing/2014/main" val="2915559009"/>
-                  </a:ext>
-                </a:extLst>
-              </a:tr>
-              <a:tr h="370840">
-                <a:tc>
-                  <a:txBody>
-                    <a:bodyPr/>
-                    <a:lstStyle/>
-                    <a:p>
-                      <a:pPr algn="ctr"/>
-                      <a:r>
-                        <a:rPr lang="en-US" sz="2000" dirty="0"/>
-                        <a:t>Multi-Attention</a:t>
-                      </a:r>
-                    </a:p>
-                  </a:txBody>
-                  <a:tcPr/>
-                </a:tc>
-                <a:tc>
-                  <a:txBody>
-                    <a:bodyPr/>
-                    <a:lstStyle/>
-                    <a:p>
-                      <a:pPr algn="ctr" fontAlgn="ctr"/>
-                      <a:r>
-                        <a:rPr lang="en-US" sz="2000" dirty="0">
-                          <a:effectLst/>
-                        </a:rPr>
-                        <a:t>0.593</a:t>
-                      </a:r>
-                    </a:p>
-                  </a:txBody>
-                  <a:tcPr marL="21771" marR="21771" marT="21771" marB="21771" anchor="ctr"/>
-                </a:tc>
-                <a:tc>
-                  <a:txBody>
-                    <a:bodyPr/>
-                    <a:lstStyle/>
-                    <a:p>
-                      <a:pPr algn="ctr" fontAlgn="ctr"/>
-                      <a:r>
-                        <a:rPr lang="en-US" sz="2000" dirty="0">
-                          <a:effectLst/>
-                        </a:rPr>
-                        <a:t>0.463</a:t>
-                      </a:r>
-                    </a:p>
-                  </a:txBody>
-                  <a:tcPr marL="21771" marR="21771" marT="21771" marB="21771" anchor="ctr"/>
-                </a:tc>
-                <a:tc>
-                  <a:txBody>
-                    <a:bodyPr/>
-                    <a:lstStyle/>
-                    <a:p>
-                      <a:pPr algn="ctr" fontAlgn="ctr"/>
-                      <a:r>
-                        <a:rPr lang="en-US" sz="2000" dirty="0">
-                          <a:effectLst/>
-                        </a:rPr>
-                        <a:t>0.340</a:t>
-                      </a:r>
-                    </a:p>
-                  </a:txBody>
-                  <a:tcPr marL="21771" marR="21771" marT="21771" marB="21771" anchor="ctr"/>
-                </a:tc>
-                <a:tc>
-                  <a:txBody>
-                    <a:bodyPr/>
-                    <a:lstStyle/>
-                    <a:p>
-                      <a:pPr algn="ctr" fontAlgn="ctr"/>
-                      <a:r>
-                        <a:rPr lang="en-US" sz="2000" dirty="0">
-                          <a:effectLst/>
-                        </a:rPr>
-                        <a:t>0.321</a:t>
-                      </a:r>
-                    </a:p>
-                  </a:txBody>
-                  <a:tcPr marL="21771" marR="21771" marT="21771" marB="21771" anchor="ctr"/>
-                </a:tc>
-                <a:tc>
-                  <a:txBody>
-                    <a:bodyPr/>
-                    <a:lstStyle/>
-                    <a:p>
-                      <a:pPr algn="ctr" fontAlgn="ctr"/>
-                      <a:r>
-                        <a:rPr lang="en-US" sz="2000" dirty="0">
-                          <a:effectLst/>
-                        </a:rPr>
-                        <a:t>0.271</a:t>
-                      </a:r>
-                    </a:p>
-                  </a:txBody>
-                  <a:tcPr marL="21771" marR="21771" marT="21771" marB="21771" anchor="ctr"/>
-                </a:tc>
-                <a:tc>
-                  <a:txBody>
-                    <a:bodyPr/>
-                    <a:lstStyle/>
-                    <a:p>
-                      <a:pPr algn="ctr" fontAlgn="ctr"/>
-                      <a:r>
-                        <a:rPr lang="en-US" sz="2000" dirty="0">
-                          <a:effectLst/>
-                        </a:rPr>
-                        <a:t>0.498</a:t>
-                      </a:r>
-                    </a:p>
-                  </a:txBody>
-                  <a:tcPr marL="21771" marR="21771" marT="21771" marB="21771" anchor="ctr"/>
-                </a:tc>
-                <a:tc>
-                  <a:txBody>
-                    <a:bodyPr/>
-                    <a:lstStyle/>
-                    <a:p>
-                      <a:pPr algn="ctr" fontAlgn="ctr"/>
-                      <a:r>
-                        <a:rPr lang="en-US" sz="2000" dirty="0">
-                          <a:effectLst/>
-                        </a:rPr>
-                        <a:t>1.738</a:t>
-                      </a:r>
-                    </a:p>
-                  </a:txBody>
-                  <a:tcPr marL="21771" marR="21771" marT="21771" marB="21771" anchor="ctr"/>
-                </a:tc>
-                <a:tc>
-                  <a:txBody>
-                    <a:bodyPr/>
-                    <a:lstStyle/>
-                    <a:p>
-                      <a:pPr algn="ctr" fontAlgn="ctr"/>
-                      <a:r>
-                        <a:rPr lang="en-US" sz="2000" dirty="0">
-                          <a:effectLst/>
-                        </a:rPr>
-                        <a:t>0.345</a:t>
-                      </a:r>
-                    </a:p>
-                  </a:txBody>
-                  <a:tcPr marL="21771" marR="21771" marT="21771" marB="21771" anchor="ctr"/>
-                </a:tc>
-                <a:tc>
-                  <a:txBody>
-                    <a:bodyPr/>
-                    <a:lstStyle/>
-                    <a:p>
-                      <a:pPr algn="ctr" fontAlgn="ctr"/>
-                      <a:r>
-                        <a:rPr lang="en-US" sz="2000" dirty="0">
-                          <a:effectLst/>
-                        </a:rPr>
-                        <a:t>0.583</a:t>
-                      </a:r>
-                    </a:p>
-                  </a:txBody>
-                  <a:tcPr marL="21771" marR="21771" marT="21771" marB="21771" anchor="ctr"/>
-                </a:tc>
-                <a:extLst>
-                  <a:ext uri="{0D108BD9-81ED-4DB2-BD59-A6C34878D82A}">
-                    <a16:rowId xmlns:a16="http://schemas.microsoft.com/office/drawing/2014/main" val="2467148437"/>
-                  </a:ext>
-                </a:extLst>
-              </a:tr>
-            </a:tbl>
-          </a:graphicData>
-        </a:graphic>
-      </p:graphicFrame>
+          <p:cNvPicPr>
+            <a:picLocks noChangeAspect="1"/>
+          </p:cNvPicPr>
+          <p:nvPr/>
+        </p:nvPicPr>
+        <p:blipFill>
+          <a:blip r:embed="rId2"/>
+          <a:stretch>
+            <a:fillRect/>
+          </a:stretch>
+        </p:blipFill>
+        <p:spPr>
+          <a:xfrm>
+            <a:off x="4908224" y="1480816"/>
+            <a:ext cx="6704906" cy="4191335"/>
+          </a:xfrm>
+          <a:prstGeom prst="rect">
+            <a:avLst/>
+          </a:prstGeom>
+        </p:spPr>
+      </p:pic>
     </p:spTree>
     <p:extLst>
       <p:ext uri="{BB962C8B-B14F-4D97-AF65-F5344CB8AC3E}">
-        <p14:creationId xmlns:p14="http://schemas.microsoft.com/office/powerpoint/2010/main" val="1676487083"/>
+        <p14:creationId xmlns:p14="http://schemas.microsoft.com/office/powerpoint/2010/main" val="3009043558"/>
       </p:ext>
     </p:extLst>
   </p:cSld>
@@ -8102,7 +7214,7 @@
           <p:cNvPr id="5" name="Footer Placeholder 4">
             <a:extLst>
               <a:ext uri="{FF2B5EF4-FFF2-40B4-BE49-F238E27FC236}">
-                <a16:creationId xmlns:a16="http://schemas.microsoft.com/office/drawing/2014/main" id="{4588D238-E86C-4146-AB2A-0834022F788A}"/>
+                <a16:creationId xmlns:a16="http://schemas.microsoft.com/office/drawing/2014/main" id="{D9C9D3CC-B95D-9541-A8DC-E0FADFB5C819}"/>
               </a:ext>
             </a:extLst>
           </p:cNvPr>
@@ -8141,7 +7253,7 @@
           <p:cNvPr id="6" name="Title 1">
             <a:extLst>
               <a:ext uri="{FF2B5EF4-FFF2-40B4-BE49-F238E27FC236}">
-                <a16:creationId xmlns:a16="http://schemas.microsoft.com/office/drawing/2014/main" id="{79AD9F70-3C92-FC44-916B-D40CEEAA523D}"/>
+                <a16:creationId xmlns:a16="http://schemas.microsoft.com/office/drawing/2014/main" id="{42EC2929-4B37-EB41-8EAE-566B58505BEB}"/>
               </a:ext>
             </a:extLst>
           </p:cNvPr>
@@ -8154,8 +7266,8 @@
         </p:nvSpPr>
         <p:spPr>
           <a:xfrm>
-            <a:off x="1121312" y="330045"/>
-            <a:ext cx="11005916" cy="1325563"/>
+            <a:off x="1178169" y="376848"/>
+            <a:ext cx="10515600" cy="1325563"/>
           </a:xfrm>
         </p:spPr>
         <p:txBody>
@@ -8165,14 +7277,9 @@
           <a:lstStyle/>
           <a:p>
             <a:r>
-              <a:rPr lang="en-US" sz="3600" b="1" dirty="0">
-                <a:solidFill>
-                  <a:prstClr val="black"/>
-                </a:solidFill>
-              </a:rPr>
-              <a:t>Evaluation scores from the best model of each structure</a:t>
-            </a:r>
-            <a:endParaRPr lang="en-US" sz="3600" b="1" dirty="0"/>
+              <a:rPr lang="en-US" sz="3600" b="1" dirty="0"/>
+              <a:t>Other considerations</a:t>
+            </a:r>
           </a:p>
         </p:txBody>
       </p:sp>
@@ -8181,7 +7288,7 @@
           <p:cNvPr id="7" name="TextBox 6">
             <a:extLst>
               <a:ext uri="{FF2B5EF4-FFF2-40B4-BE49-F238E27FC236}">
-                <a16:creationId xmlns:a16="http://schemas.microsoft.com/office/drawing/2014/main" id="{F1B81E3C-A6FF-4346-92A6-F2077641832B}"/>
+                <a16:creationId xmlns:a16="http://schemas.microsoft.com/office/drawing/2014/main" id="{13809B36-38A7-7148-AD57-CB8286A826A9}"/>
               </a:ext>
             </a:extLst>
           </p:cNvPr>
@@ -8190,8 +7297,8 @@
         </p:nvSpPr>
         <p:spPr>
           <a:xfrm>
-            <a:off x="1121312" y="1875847"/>
-            <a:ext cx="7107202" cy="492443"/>
+            <a:off x="1178169" y="1702411"/>
+            <a:ext cx="10587111" cy="1692771"/>
           </a:xfrm>
           <a:prstGeom prst="rect">
             <a:avLst/>
@@ -8199,1045 +7306,43 @@
           <a:noFill/>
         </p:spPr>
         <p:txBody>
-          <a:bodyPr wrap="none" rtlCol="0">
+          <a:bodyPr wrap="square" rtlCol="0">
             <a:spAutoFit/>
           </a:bodyPr>
           <a:lstStyle/>
           <a:p>
+            <a:pPr marL="342900" indent="-342900">
+              <a:buAutoNum type="arabicPeriod"/>
+            </a:pPr>
             <a:r>
               <a:rPr lang="en-US" sz="2600" dirty="0"/>
-              <a:t>Test data and train data are from </a:t>
-            </a:r>
-            <a:r>
-              <a:rPr lang="en-US" sz="2600" b="1" dirty="0"/>
-              <a:t>different</a:t>
-            </a:r>
+              <a:t>CNN models learned from scratch</a:t>
+            </a:r>
+          </a:p>
+          <a:p>
+            <a:pPr marL="342900" indent="-342900">
+              <a:buAutoNum type="arabicPeriod"/>
+            </a:pPr>
+            <a:endParaRPr lang="en-US" sz="2600" dirty="0"/>
+          </a:p>
+          <a:p>
+            <a:pPr marL="342900" indent="-342900">
+              <a:buAutoNum type="arabicPeriod"/>
+            </a:pPr>
             <a:r>
               <a:rPr lang="en-US" sz="2600" dirty="0"/>
-              <a:t> datasets</a:t>
-            </a:r>
-          </a:p>
-        </p:txBody>
-      </p:sp>
-      <p:sp>
-        <p:nvSpPr>
-          <p:cNvPr id="8" name="TextBox 7">
-            <a:extLst>
-              <a:ext uri="{FF2B5EF4-FFF2-40B4-BE49-F238E27FC236}">
-                <a16:creationId xmlns:a16="http://schemas.microsoft.com/office/drawing/2014/main" id="{13AC1009-D7F3-E74B-8E01-EC694A547454}"/>
-              </a:ext>
-            </a:extLst>
-          </p:cNvPr>
-          <p:cNvSpPr txBox="1"/>
-          <p:nvPr/>
-        </p:nvSpPr>
-        <p:spPr>
-          <a:xfrm>
-            <a:off x="1121312" y="1273284"/>
-            <a:ext cx="4221990" cy="492443"/>
-          </a:xfrm>
-          <a:prstGeom prst="rect">
-            <a:avLst/>
-          </a:prstGeom>
-          <a:noFill/>
-        </p:spPr>
-        <p:txBody>
-          <a:bodyPr wrap="none" rtlCol="0">
-            <a:spAutoFit/>
-          </a:bodyPr>
-          <a:lstStyle/>
-          <a:p>
-            <a:r>
-              <a:rPr lang="en-US" sz="2600" b="1" dirty="0"/>
-              <a:t>Testing Model Generalization</a:t>
-            </a:r>
-          </a:p>
-        </p:txBody>
-      </p:sp>
-      <p:graphicFrame>
-        <p:nvGraphicFramePr>
-          <p:cNvPr id="9" name="Table 3">
-            <a:extLst>
-              <a:ext uri="{FF2B5EF4-FFF2-40B4-BE49-F238E27FC236}">
-                <a16:creationId xmlns:a16="http://schemas.microsoft.com/office/drawing/2014/main" id="{CE8EC28B-38E6-F24C-893A-E695D2797071}"/>
-              </a:ext>
-            </a:extLst>
-          </p:cNvPr>
-          <p:cNvGraphicFramePr>
-            <a:graphicFrameLocks noGrp="1"/>
-          </p:cNvGraphicFramePr>
-          <p:nvPr>
-            <p:extLst>
-              <p:ext uri="{D42A27DB-BD31-4B8C-83A1-F6EECF244321}">
-                <p14:modId xmlns:p14="http://schemas.microsoft.com/office/powerpoint/2010/main" val="206319611"/>
-              </p:ext>
-            </p:extLst>
-          </p:nvPr>
-        </p:nvGraphicFramePr>
-        <p:xfrm>
-          <a:off x="1060352" y="2588529"/>
-          <a:ext cx="10645144" cy="2792149"/>
-        </p:xfrm>
-        <a:graphic>
-          <a:graphicData uri="http://schemas.openxmlformats.org/drawingml/2006/table">
-            <a:tbl>
-              <a:tblPr firstRow="1" bandRow="1">
-                <a:tableStyleId>{5C22544A-7EE6-4342-B048-85BDC9FD1C3A}</a:tableStyleId>
-              </a:tblPr>
-              <a:tblGrid>
-                <a:gridCol w="1211580">
-                  <a:extLst>
-                    <a:ext uri="{9D8B030D-6E8A-4147-A177-3AD203B41FA5}">
-                      <a16:colId xmlns:a16="http://schemas.microsoft.com/office/drawing/2014/main" val="2078863130"/>
-                    </a:ext>
-                  </a:extLst>
-                </a:gridCol>
-                <a:gridCol w="845820">
-                  <a:extLst>
-                    <a:ext uri="{9D8B030D-6E8A-4147-A177-3AD203B41FA5}">
-                      <a16:colId xmlns:a16="http://schemas.microsoft.com/office/drawing/2014/main" val="3621588296"/>
-                    </a:ext>
-                  </a:extLst>
-                </a:gridCol>
-                <a:gridCol w="906781">
-                  <a:extLst>
-                    <a:ext uri="{9D8B030D-6E8A-4147-A177-3AD203B41FA5}">
-                      <a16:colId xmlns:a16="http://schemas.microsoft.com/office/drawing/2014/main" val="4155945170"/>
-                    </a:ext>
-                  </a:extLst>
-                </a:gridCol>
-                <a:gridCol w="906780">
-                  <a:extLst>
-                    <a:ext uri="{9D8B030D-6E8A-4147-A177-3AD203B41FA5}">
-                      <a16:colId xmlns:a16="http://schemas.microsoft.com/office/drawing/2014/main" val="993797696"/>
-                    </a:ext>
-                  </a:extLst>
-                </a:gridCol>
-                <a:gridCol w="876301">
-                  <a:extLst>
-                    <a:ext uri="{9D8B030D-6E8A-4147-A177-3AD203B41FA5}">
-                      <a16:colId xmlns:a16="http://schemas.microsoft.com/office/drawing/2014/main" val="1765691710"/>
-                    </a:ext>
-                  </a:extLst>
-                </a:gridCol>
-                <a:gridCol w="1150620">
-                  <a:extLst>
-                    <a:ext uri="{9D8B030D-6E8A-4147-A177-3AD203B41FA5}">
-                      <a16:colId xmlns:a16="http://schemas.microsoft.com/office/drawing/2014/main" val="1250124610"/>
-                    </a:ext>
-                  </a:extLst>
-                </a:gridCol>
-                <a:gridCol w="1150621">
-                  <a:extLst>
-                    <a:ext uri="{9D8B030D-6E8A-4147-A177-3AD203B41FA5}">
-                      <a16:colId xmlns:a16="http://schemas.microsoft.com/office/drawing/2014/main" val="2692160144"/>
-                    </a:ext>
-                  </a:extLst>
-                </a:gridCol>
-                <a:gridCol w="952501">
-                  <a:extLst>
-                    <a:ext uri="{9D8B030D-6E8A-4147-A177-3AD203B41FA5}">
-                      <a16:colId xmlns:a16="http://schemas.microsoft.com/office/drawing/2014/main" val="1671396394"/>
-                    </a:ext>
-                  </a:extLst>
-                </a:gridCol>
-                <a:gridCol w="914400">
-                  <a:extLst>
-                    <a:ext uri="{9D8B030D-6E8A-4147-A177-3AD203B41FA5}">
-                      <a16:colId xmlns:a16="http://schemas.microsoft.com/office/drawing/2014/main" val="707221176"/>
-                    </a:ext>
-                  </a:extLst>
-                </a:gridCol>
-                <a:gridCol w="1729740">
-                  <a:extLst>
-                    <a:ext uri="{9D8B030D-6E8A-4147-A177-3AD203B41FA5}">
-                      <a16:colId xmlns:a16="http://schemas.microsoft.com/office/drawing/2014/main" val="3156725575"/>
-                    </a:ext>
-                  </a:extLst>
-                </a:gridCol>
-              </a:tblGrid>
-              <a:tr h="670368">
-                <a:tc>
-                  <a:txBody>
-                    <a:bodyPr/>
-                    <a:lstStyle/>
-                    <a:p>
-                      <a:pPr algn="l" fontAlgn="ctr"/>
-                      <a:endParaRPr lang="en-US" sz="2000" b="1" dirty="0">
-                        <a:effectLst/>
-                      </a:endParaRPr>
-                    </a:p>
-                  </a:txBody>
-                  <a:tcPr marL="21771" marR="21771" marT="21771" marB="21771" anchor="ctr"/>
-                </a:tc>
-                <a:tc gridSpan="7">
-                  <a:txBody>
-                    <a:bodyPr/>
-                    <a:lstStyle/>
-                    <a:p>
-                      <a:pPr algn="ctr" fontAlgn="ctr"/>
-                      <a:r>
-                        <a:rPr lang="en-US" sz="2000" dirty="0">
-                          <a:effectLst/>
-                        </a:rPr>
-                        <a:t>n-gram Comparison Evaluation</a:t>
-                      </a:r>
-                      <a:endParaRPr lang="en-US" sz="2000" b="1" dirty="0">
-                        <a:effectLst/>
-                      </a:endParaRPr>
-                    </a:p>
-                  </a:txBody>
-                  <a:tcPr marL="21771" marR="21771" marT="21771" marB="21771" anchor="ctr"/>
-                </a:tc>
-                <a:tc hMerge="1">
-                  <a:txBody>
-                    <a:bodyPr/>
-                    <a:lstStyle/>
-                    <a:p>
-                      <a:pPr algn="l" fontAlgn="ctr"/>
-                      <a:endParaRPr lang="en-US" b="1" dirty="0">
-                        <a:effectLst/>
-                      </a:endParaRPr>
-                    </a:p>
-                  </a:txBody>
-                  <a:tcPr marL="21771" marR="21771" marT="21771" marB="21771" anchor="ctr"/>
-                </a:tc>
-                <a:tc hMerge="1">
-                  <a:txBody>
-                    <a:bodyPr/>
-                    <a:lstStyle/>
-                    <a:p>
-                      <a:pPr algn="l" fontAlgn="ctr"/>
-                      <a:endParaRPr lang="en-US" b="1" dirty="0">
-                        <a:effectLst/>
-                      </a:endParaRPr>
-                    </a:p>
-                  </a:txBody>
-                  <a:tcPr marL="21771" marR="21771" marT="21771" marB="21771" anchor="ctr"/>
-                </a:tc>
-                <a:tc hMerge="1">
-                  <a:txBody>
-                    <a:bodyPr/>
-                    <a:lstStyle/>
-                    <a:p>
-                      <a:pPr algn="l" fontAlgn="ctr"/>
-                      <a:endParaRPr lang="en-US" b="1" dirty="0">
-                        <a:effectLst/>
-                      </a:endParaRPr>
-                    </a:p>
-                  </a:txBody>
-                  <a:tcPr marL="21771" marR="21771" marT="21771" marB="21771" anchor="ctr"/>
-                </a:tc>
-                <a:tc hMerge="1">
-                  <a:txBody>
-                    <a:bodyPr/>
-                    <a:lstStyle/>
-                    <a:p>
-                      <a:pPr algn="l" fontAlgn="ctr"/>
-                      <a:endParaRPr lang="en-US" b="1" dirty="0">
-                        <a:effectLst/>
-                      </a:endParaRPr>
-                    </a:p>
-                  </a:txBody>
-                  <a:tcPr marL="21771" marR="21771" marT="21771" marB="21771" anchor="ctr"/>
-                </a:tc>
-                <a:tc hMerge="1">
-                  <a:txBody>
-                    <a:bodyPr/>
-                    <a:lstStyle/>
-                    <a:p>
-                      <a:pPr algn="l" fontAlgn="ctr"/>
-                      <a:endParaRPr lang="en-US" b="1" dirty="0">
-                        <a:effectLst/>
-                      </a:endParaRPr>
-                    </a:p>
-                  </a:txBody>
-                  <a:tcPr marL="21771" marR="21771" marT="21771" marB="21771" anchor="ctr"/>
-                </a:tc>
-                <a:tc hMerge="1">
-                  <a:txBody>
-                    <a:bodyPr/>
-                    <a:lstStyle/>
-                    <a:p>
-                      <a:pPr algn="l" fontAlgn="ctr"/>
-                      <a:endParaRPr lang="en-US" b="1" dirty="0">
-                        <a:effectLst/>
-                      </a:endParaRPr>
-                    </a:p>
-                  </a:txBody>
-                  <a:tcPr marL="21771" marR="21771" marT="21771" marB="21771" anchor="ctr"/>
-                </a:tc>
-                <a:tc gridSpan="2">
-                  <a:txBody>
-                    <a:bodyPr/>
-                    <a:lstStyle/>
-                    <a:p>
-                      <a:pPr algn="ctr" fontAlgn="ctr"/>
-                      <a:r>
-                        <a:rPr lang="en-US" sz="2000" u="none" strike="noStrike" kern="1200" dirty="0">
-                          <a:effectLst/>
-                        </a:rPr>
-                        <a:t>Semantic</a:t>
-                      </a:r>
-                      <a:r>
-                        <a:rPr lang="en-US" sz="2000" dirty="0">
-                          <a:effectLst/>
-                        </a:rPr>
-                        <a:t> Evaluation</a:t>
-                      </a:r>
-                      <a:endParaRPr lang="en-US" sz="2000" b="1" dirty="0">
-                        <a:effectLst/>
-                      </a:endParaRPr>
-                    </a:p>
-                  </a:txBody>
-                  <a:tcPr marL="21771" marR="21771" marT="21771" marB="21771" anchor="ctr"/>
-                </a:tc>
-                <a:tc hMerge="1">
-                  <a:txBody>
-                    <a:bodyPr/>
-                    <a:lstStyle/>
-                    <a:p>
-                      <a:pPr algn="ctr" fontAlgn="ctr"/>
-                      <a:endParaRPr lang="en-US" sz="2000" b="1" dirty="0">
-                        <a:effectLst/>
-                      </a:endParaRPr>
-                    </a:p>
-                  </a:txBody>
-                  <a:tcPr marL="21771" marR="21771" marT="21771" marB="21771" anchor="ctr"/>
-                </a:tc>
-                <a:extLst>
-                  <a:ext uri="{0D108BD9-81ED-4DB2-BD59-A6C34878D82A}">
-                    <a16:rowId xmlns:a16="http://schemas.microsoft.com/office/drawing/2014/main" val="4135081847"/>
-                  </a:ext>
-                </a:extLst>
-              </a:tr>
-              <a:tr h="495656">
-                <a:tc>
-                  <a:txBody>
-                    <a:bodyPr/>
-                    <a:lstStyle/>
-                    <a:p>
-                      <a:pPr algn="ctr" fontAlgn="ctr"/>
-                      <a:r>
-                        <a:rPr lang="en-US" sz="2000" dirty="0">
-                          <a:effectLst/>
-                        </a:rPr>
-                        <a:t>MODEL</a:t>
-                      </a:r>
-                      <a:endParaRPr lang="en-US" sz="2000" b="1" dirty="0">
-                        <a:effectLst/>
-                      </a:endParaRPr>
-                    </a:p>
-                  </a:txBody>
-                  <a:tcPr marL="21771" marR="21771" marT="21771" marB="21771" anchor="ctr"/>
-                </a:tc>
-                <a:tc>
-                  <a:txBody>
-                    <a:bodyPr/>
-                    <a:lstStyle/>
-                    <a:p>
-                      <a:pPr algn="ctr" fontAlgn="ctr"/>
-                      <a:r>
-                        <a:rPr lang="en-US" sz="2000" dirty="0">
-                          <a:effectLst/>
-                        </a:rPr>
-                        <a:t>Bleu 1</a:t>
-                      </a:r>
-                      <a:endParaRPr lang="en-US" sz="2000" b="1" dirty="0">
-                        <a:effectLst/>
-                      </a:endParaRPr>
-                    </a:p>
-                  </a:txBody>
-                  <a:tcPr marL="21771" marR="21771" marT="21771" marB="21771" anchor="ctr"/>
-                </a:tc>
-                <a:tc>
-                  <a:txBody>
-                    <a:bodyPr/>
-                    <a:lstStyle/>
-                    <a:p>
-                      <a:pPr algn="ctr" fontAlgn="ctr"/>
-                      <a:r>
-                        <a:rPr lang="en-US" sz="2000" dirty="0">
-                          <a:effectLst/>
-                        </a:rPr>
-                        <a:t>Bleu 2</a:t>
-                      </a:r>
-                      <a:endParaRPr lang="en-US" sz="2000" b="1" dirty="0">
-                        <a:effectLst/>
-                      </a:endParaRPr>
-                    </a:p>
-                  </a:txBody>
-                  <a:tcPr marL="21771" marR="21771" marT="21771" marB="21771" anchor="ctr"/>
-                </a:tc>
-                <a:tc>
-                  <a:txBody>
-                    <a:bodyPr/>
-                    <a:lstStyle/>
-                    <a:p>
-                      <a:pPr algn="ctr" fontAlgn="ctr"/>
-                      <a:r>
-                        <a:rPr lang="en-US" sz="2000" dirty="0">
-                          <a:effectLst/>
-                        </a:rPr>
-                        <a:t>Bleu 3</a:t>
-                      </a:r>
-                      <a:endParaRPr lang="en-US" sz="2000" b="1" dirty="0">
-                        <a:effectLst/>
-                      </a:endParaRPr>
-                    </a:p>
-                  </a:txBody>
-                  <a:tcPr marL="21771" marR="21771" marT="21771" marB="21771" anchor="ctr"/>
-                </a:tc>
-                <a:tc>
-                  <a:txBody>
-                    <a:bodyPr/>
-                    <a:lstStyle/>
-                    <a:p>
-                      <a:pPr algn="ctr" fontAlgn="ctr"/>
-                      <a:r>
-                        <a:rPr lang="en-US" sz="2000" dirty="0">
-                          <a:effectLst/>
-                        </a:rPr>
-                        <a:t>Bleu 4</a:t>
-                      </a:r>
-                      <a:endParaRPr lang="en-US" sz="2000" b="1" dirty="0">
-                        <a:effectLst/>
-                      </a:endParaRPr>
-                    </a:p>
-                  </a:txBody>
-                  <a:tcPr marL="21771" marR="21771" marT="21771" marB="21771" anchor="ctr"/>
-                </a:tc>
-                <a:tc>
-                  <a:txBody>
-                    <a:bodyPr/>
-                    <a:lstStyle/>
-                    <a:p>
-                      <a:pPr algn="ctr" fontAlgn="ctr"/>
-                      <a:r>
-                        <a:rPr lang="en-US" sz="2000" dirty="0">
-                          <a:effectLst/>
-                        </a:rPr>
-                        <a:t>METEOR</a:t>
-                      </a:r>
-                      <a:endParaRPr lang="en-US" sz="2000" b="1" dirty="0">
-                        <a:effectLst/>
-                      </a:endParaRPr>
-                    </a:p>
-                  </a:txBody>
-                  <a:tcPr marL="21771" marR="21771" marT="21771" marB="21771" anchor="ctr"/>
-                </a:tc>
-                <a:tc>
-                  <a:txBody>
-                    <a:bodyPr/>
-                    <a:lstStyle/>
-                    <a:p>
-                      <a:pPr algn="ctr" fontAlgn="ctr"/>
-                      <a:r>
-                        <a:rPr lang="en-US" sz="2000" dirty="0">
-                          <a:effectLst/>
-                        </a:rPr>
-                        <a:t>ROUGE L</a:t>
-                      </a:r>
-                      <a:endParaRPr lang="en-US" sz="2000" b="1" dirty="0">
-                        <a:effectLst/>
-                      </a:endParaRPr>
-                    </a:p>
-                  </a:txBody>
-                  <a:tcPr marL="21771" marR="21771" marT="21771" marB="21771" anchor="ctr"/>
-                </a:tc>
-                <a:tc>
-                  <a:txBody>
-                    <a:bodyPr/>
-                    <a:lstStyle/>
-                    <a:p>
-                      <a:pPr algn="ctr" fontAlgn="ctr"/>
-                      <a:r>
-                        <a:rPr lang="en-US" sz="2000" dirty="0">
-                          <a:effectLst/>
-                        </a:rPr>
-                        <a:t>CIDEr</a:t>
-                      </a:r>
-                      <a:endParaRPr lang="en-US" sz="2000" b="1" dirty="0">
-                        <a:effectLst/>
-                      </a:endParaRPr>
-                    </a:p>
-                  </a:txBody>
-                  <a:tcPr marL="21771" marR="21771" marT="21771" marB="21771" anchor="ctr"/>
-                </a:tc>
-                <a:tc>
-                  <a:txBody>
-                    <a:bodyPr/>
-                    <a:lstStyle/>
-                    <a:p>
-                      <a:pPr algn="ctr" fontAlgn="ctr"/>
-                      <a:r>
-                        <a:rPr lang="en-US" sz="2000" dirty="0">
-                          <a:effectLst/>
-                        </a:rPr>
-                        <a:t>SPICE</a:t>
-                      </a:r>
-                      <a:endParaRPr lang="en-US" sz="2000" b="1" dirty="0">
-                        <a:effectLst/>
-                      </a:endParaRPr>
-                    </a:p>
-                  </a:txBody>
-                  <a:tcPr marL="21771" marR="21771" marT="21771" marB="21771" anchor="ctr"/>
-                </a:tc>
-                <a:tc>
-                  <a:txBody>
-                    <a:bodyPr/>
-                    <a:lstStyle/>
-                    <a:p>
-                      <a:pPr algn="ctr" fontAlgn="ctr"/>
-                      <a:r>
-                        <a:rPr lang="en-US" sz="2000" dirty="0">
-                          <a:effectLst/>
-                        </a:rPr>
-                        <a:t>USC Similarity</a:t>
-                      </a:r>
-                      <a:endParaRPr lang="en-US" sz="2000" b="1" dirty="0">
-                        <a:effectLst/>
-                      </a:endParaRPr>
-                    </a:p>
-                  </a:txBody>
-                  <a:tcPr marL="21771" marR="21771" marT="21771" marB="21771" anchor="ctr"/>
-                </a:tc>
-                <a:extLst>
-                  <a:ext uri="{0D108BD9-81ED-4DB2-BD59-A6C34878D82A}">
-                    <a16:rowId xmlns:a16="http://schemas.microsoft.com/office/drawing/2014/main" val="2072018098"/>
-                  </a:ext>
-                </a:extLst>
-              </a:tr>
-              <a:tr h="436073">
-                <a:tc>
-                  <a:txBody>
-                    <a:bodyPr/>
-                    <a:lstStyle/>
-                    <a:p>
-                      <a:pPr algn="ctr"/>
-                      <a:r>
-                        <a:rPr lang="en-US" sz="2000" dirty="0"/>
-                        <a:t>Baseline</a:t>
-                      </a:r>
-                    </a:p>
-                  </a:txBody>
-                  <a:tcPr/>
-                </a:tc>
-                <a:tc>
-                  <a:txBody>
-                    <a:bodyPr/>
-                    <a:lstStyle/>
-                    <a:p>
-                      <a:pPr algn="ctr" fontAlgn="ctr"/>
-                      <a:r>
-                        <a:rPr lang="en-US" sz="2000" dirty="0">
-                          <a:effectLst/>
-                        </a:rPr>
-                        <a:t>0.453</a:t>
-                      </a:r>
-                      <a:endParaRPr lang="en-US" sz="2000" b="1" dirty="0">
-                        <a:effectLst/>
-                      </a:endParaRPr>
-                    </a:p>
-                  </a:txBody>
-                  <a:tcPr marL="21771" marR="21771" marT="21771" marB="21771" anchor="ctr"/>
-                </a:tc>
-                <a:tc>
-                  <a:txBody>
-                    <a:bodyPr/>
-                    <a:lstStyle/>
-                    <a:p>
-                      <a:pPr algn="ctr" fontAlgn="ctr"/>
-                      <a:r>
-                        <a:rPr lang="en-US" sz="2000" dirty="0">
-                          <a:effectLst/>
-                        </a:rPr>
-                        <a:t>0.220</a:t>
-                      </a:r>
-                      <a:endParaRPr lang="en-US" sz="2000" b="1" dirty="0">
-                        <a:effectLst/>
-                      </a:endParaRPr>
-                    </a:p>
-                  </a:txBody>
-                  <a:tcPr marL="21771" marR="21771" marT="21771" marB="21771" anchor="ctr"/>
-                </a:tc>
-                <a:tc>
-                  <a:txBody>
-                    <a:bodyPr/>
-                    <a:lstStyle/>
-                    <a:p>
-                      <a:pPr algn="ctr" fontAlgn="ctr"/>
-                      <a:r>
-                        <a:rPr lang="en-US" sz="2000" dirty="0">
-                          <a:effectLst/>
-                        </a:rPr>
-                        <a:t>0.117</a:t>
-                      </a:r>
-                      <a:endParaRPr lang="en-US" sz="2000" b="1" dirty="0">
-                        <a:effectLst/>
-                      </a:endParaRPr>
-                    </a:p>
-                  </a:txBody>
-                  <a:tcPr marL="21771" marR="21771" marT="21771" marB="21771" anchor="ctr"/>
-                </a:tc>
-                <a:tc>
-                  <a:txBody>
-                    <a:bodyPr/>
-                    <a:lstStyle/>
-                    <a:p>
-                      <a:pPr algn="ctr" fontAlgn="ctr"/>
-                      <a:r>
-                        <a:rPr lang="en-US" sz="2000" dirty="0">
-                          <a:effectLst/>
-                        </a:rPr>
-                        <a:t>0.0717</a:t>
-                      </a:r>
-                      <a:endParaRPr lang="en-US" sz="2000" b="1" dirty="0">
-                        <a:effectLst/>
-                      </a:endParaRPr>
-                    </a:p>
-                  </a:txBody>
-                  <a:tcPr marL="21771" marR="21771" marT="21771" marB="21771" anchor="ctr"/>
-                </a:tc>
-                <a:tc>
-                  <a:txBody>
-                    <a:bodyPr/>
-                    <a:lstStyle/>
-                    <a:p>
-                      <a:pPr algn="ctr" fontAlgn="ctr"/>
-                      <a:r>
-                        <a:rPr lang="en-US" sz="2000" dirty="0">
-                          <a:effectLst/>
-                        </a:rPr>
-                        <a:t>0.145</a:t>
-                      </a:r>
-                      <a:endParaRPr lang="en-US" sz="2000" b="1" dirty="0">
-                        <a:effectLst/>
-                      </a:endParaRPr>
-                    </a:p>
-                  </a:txBody>
-                  <a:tcPr marL="21771" marR="21771" marT="21771" marB="21771" anchor="ctr"/>
-                </a:tc>
-                <a:tc>
-                  <a:txBody>
-                    <a:bodyPr/>
-                    <a:lstStyle/>
-                    <a:p>
-                      <a:pPr algn="ctr" fontAlgn="ctr"/>
-                      <a:r>
-                        <a:rPr lang="en-US" sz="2000" dirty="0">
-                          <a:effectLst/>
-                        </a:rPr>
-                        <a:t>0.290</a:t>
-                      </a:r>
-                      <a:endParaRPr lang="en-US" sz="2000" b="1" dirty="0">
-                        <a:effectLst/>
-                      </a:endParaRPr>
-                    </a:p>
-                  </a:txBody>
-                  <a:tcPr marL="21771" marR="21771" marT="21771" marB="21771" anchor="ctr"/>
-                </a:tc>
-                <a:tc>
-                  <a:txBody>
-                    <a:bodyPr/>
-                    <a:lstStyle/>
-                    <a:p>
-                      <a:pPr algn="ctr" fontAlgn="ctr"/>
-                      <a:r>
-                        <a:rPr lang="en-US" sz="2000" dirty="0">
-                          <a:effectLst/>
-                        </a:rPr>
-                        <a:t>0.210</a:t>
-                      </a:r>
-                      <a:endParaRPr lang="en-US" sz="2000" b="1" dirty="0">
-                        <a:effectLst/>
-                      </a:endParaRPr>
-                    </a:p>
-                  </a:txBody>
-                  <a:tcPr marL="21771" marR="21771" marT="21771" marB="21771" anchor="ctr"/>
-                </a:tc>
-                <a:tc>
-                  <a:txBody>
-                    <a:bodyPr/>
-                    <a:lstStyle/>
-                    <a:p>
-                      <a:pPr algn="ctr" fontAlgn="ctr"/>
-                      <a:r>
-                        <a:rPr lang="en-US" sz="2000" dirty="0">
-                          <a:effectLst/>
-                        </a:rPr>
-                        <a:t>0.119</a:t>
-                      </a:r>
-                      <a:endParaRPr lang="en-US" sz="2000" b="1" dirty="0">
-                        <a:effectLst/>
-                      </a:endParaRPr>
-                    </a:p>
-                  </a:txBody>
-                  <a:tcPr marL="21771" marR="21771" marT="21771" marB="21771" anchor="ctr"/>
-                </a:tc>
-                <a:tc>
-                  <a:txBody>
-                    <a:bodyPr/>
-                    <a:lstStyle/>
-                    <a:p>
-                      <a:pPr algn="ctr" fontAlgn="ctr"/>
-                      <a:r>
-                        <a:rPr lang="en-US" sz="2000" dirty="0">
-                          <a:effectLst/>
-                        </a:rPr>
-                        <a:t>0.458</a:t>
-                      </a:r>
-                      <a:endParaRPr lang="en-US" sz="2000" b="1" dirty="0">
-                        <a:effectLst/>
-                      </a:endParaRPr>
-                    </a:p>
-                  </a:txBody>
-                  <a:tcPr marL="21771" marR="21771" marT="21771" marB="21771" anchor="ctr"/>
-                </a:tc>
-                <a:extLst>
-                  <a:ext uri="{0D108BD9-81ED-4DB2-BD59-A6C34878D82A}">
-                    <a16:rowId xmlns:a16="http://schemas.microsoft.com/office/drawing/2014/main" val="2426048346"/>
-                  </a:ext>
-                </a:extLst>
-              </a:tr>
-              <a:tr h="489012">
-                <a:tc>
-                  <a:txBody>
-                    <a:bodyPr/>
-                    <a:lstStyle/>
-                    <a:p>
-                      <a:pPr algn="ctr"/>
-                      <a:r>
-                        <a:rPr lang="en-US" sz="2000" dirty="0"/>
-                        <a:t>Attention</a:t>
-                      </a:r>
-                    </a:p>
-                  </a:txBody>
-                  <a:tcPr/>
-                </a:tc>
-                <a:tc>
-                  <a:txBody>
-                    <a:bodyPr/>
-                    <a:lstStyle/>
-                    <a:p>
-                      <a:pPr algn="ctr" fontAlgn="ctr"/>
-                      <a:r>
-                        <a:rPr lang="en-US" sz="2000" dirty="0">
-                          <a:effectLst/>
-                        </a:rPr>
-                        <a:t>0.431</a:t>
-                      </a:r>
-                    </a:p>
-                  </a:txBody>
-                  <a:tcPr marL="21771" marR="21771" marT="21771" marB="21771" anchor="ctr"/>
-                </a:tc>
-                <a:tc>
-                  <a:txBody>
-                    <a:bodyPr/>
-                    <a:lstStyle/>
-                    <a:p>
-                      <a:pPr algn="ctr" fontAlgn="ctr"/>
-                      <a:r>
-                        <a:rPr lang="en-US" sz="2000" dirty="0">
-                          <a:effectLst/>
-                        </a:rPr>
-                        <a:t>0.209</a:t>
-                      </a:r>
-                    </a:p>
-                  </a:txBody>
-                  <a:tcPr marL="21771" marR="21771" marT="21771" marB="21771" anchor="ctr"/>
-                </a:tc>
-                <a:tc>
-                  <a:txBody>
-                    <a:bodyPr/>
-                    <a:lstStyle/>
-                    <a:p>
-                      <a:pPr algn="ctr" fontAlgn="ctr"/>
-                      <a:r>
-                        <a:rPr lang="en-US" sz="2000" dirty="0">
-                          <a:effectLst/>
-                        </a:rPr>
-                        <a:t>0.108</a:t>
-                      </a:r>
-                    </a:p>
-                  </a:txBody>
-                  <a:tcPr marL="21771" marR="21771" marT="21771" marB="21771" anchor="ctr"/>
-                </a:tc>
-                <a:tc>
-                  <a:txBody>
-                    <a:bodyPr/>
-                    <a:lstStyle/>
-                    <a:p>
-                      <a:pPr algn="ctr" fontAlgn="ctr"/>
-                      <a:r>
-                        <a:rPr lang="en-US" sz="2000" dirty="0">
-                          <a:effectLst/>
-                        </a:rPr>
-                        <a:t>0.0687</a:t>
-                      </a:r>
-                    </a:p>
-                  </a:txBody>
-                  <a:tcPr marL="21771" marR="21771" marT="21771" marB="21771" anchor="ctr"/>
-                </a:tc>
-                <a:tc>
-                  <a:txBody>
-                    <a:bodyPr/>
-                    <a:lstStyle/>
-                    <a:p>
-                      <a:pPr algn="ctr" fontAlgn="ctr"/>
-                      <a:r>
-                        <a:rPr lang="en-US" sz="2000" dirty="0">
-                          <a:effectLst/>
-                        </a:rPr>
-                        <a:t>0.140</a:t>
-                      </a:r>
-                    </a:p>
-                  </a:txBody>
-                  <a:tcPr marL="21771" marR="21771" marT="21771" marB="21771" anchor="ctr"/>
-                </a:tc>
-                <a:tc>
-                  <a:txBody>
-                    <a:bodyPr/>
-                    <a:lstStyle/>
-                    <a:p>
-                      <a:pPr algn="ctr" fontAlgn="ctr"/>
-                      <a:r>
-                        <a:rPr lang="en-US" sz="2000" dirty="0">
-                          <a:effectLst/>
-                        </a:rPr>
-                        <a:t>0.280</a:t>
-                      </a:r>
-                    </a:p>
-                  </a:txBody>
-                  <a:tcPr marL="21771" marR="21771" marT="21771" marB="21771" anchor="ctr"/>
-                </a:tc>
-                <a:tc>
-                  <a:txBody>
-                    <a:bodyPr/>
-                    <a:lstStyle/>
-                    <a:p>
-                      <a:pPr algn="ctr" fontAlgn="ctr"/>
-                      <a:r>
-                        <a:rPr lang="en-US" sz="2000" dirty="0">
-                          <a:effectLst/>
-                        </a:rPr>
-                        <a:t>0.146</a:t>
-                      </a:r>
-                    </a:p>
-                  </a:txBody>
-                  <a:tcPr marL="21771" marR="21771" marT="21771" marB="21771" anchor="ctr"/>
-                </a:tc>
-                <a:tc>
-                  <a:txBody>
-                    <a:bodyPr/>
-                    <a:lstStyle/>
-                    <a:p>
-                      <a:pPr algn="ctr" fontAlgn="ctr"/>
-                      <a:r>
-                        <a:rPr lang="en-US" sz="2000" dirty="0">
-                          <a:effectLst/>
-                        </a:rPr>
-                        <a:t>0.114</a:t>
-                      </a:r>
-                    </a:p>
-                  </a:txBody>
-                  <a:tcPr marL="21771" marR="21771" marT="21771" marB="21771" anchor="ctr"/>
-                </a:tc>
-                <a:tc>
-                  <a:txBody>
-                    <a:bodyPr/>
-                    <a:lstStyle/>
-                    <a:p>
-                      <a:pPr algn="ctr" fontAlgn="ctr"/>
-                      <a:r>
-                        <a:rPr lang="en-US" sz="2000" dirty="0">
-                          <a:effectLst/>
-                        </a:rPr>
-                        <a:t>0.449</a:t>
-                      </a:r>
-                    </a:p>
-                  </a:txBody>
-                  <a:tcPr marL="21771" marR="21771" marT="21771" marB="21771" anchor="ctr"/>
-                </a:tc>
-                <a:extLst>
-                  <a:ext uri="{0D108BD9-81ED-4DB2-BD59-A6C34878D82A}">
-                    <a16:rowId xmlns:a16="http://schemas.microsoft.com/office/drawing/2014/main" val="2915559009"/>
-                  </a:ext>
-                </a:extLst>
-              </a:tr>
-              <a:tr h="370840">
-                <a:tc>
-                  <a:txBody>
-                    <a:bodyPr/>
-                    <a:lstStyle/>
-                    <a:p>
-                      <a:pPr algn="ctr"/>
-                      <a:r>
-                        <a:rPr lang="en-US" sz="2000" dirty="0"/>
-                        <a:t>Multi-Attention</a:t>
-                      </a:r>
-                    </a:p>
-                  </a:txBody>
-                  <a:tcPr/>
-                </a:tc>
-                <a:tc>
-                  <a:txBody>
-                    <a:bodyPr/>
-                    <a:lstStyle/>
-                    <a:p>
-                      <a:pPr algn="ctr" fontAlgn="ctr"/>
-                      <a:r>
-                        <a:rPr lang="en-US" sz="2000" dirty="0">
-                          <a:effectLst/>
-                        </a:rPr>
-                        <a:t>0.431</a:t>
-                      </a:r>
-                    </a:p>
-                  </a:txBody>
-                  <a:tcPr marL="21771" marR="21771" marT="21771" marB="21771" anchor="ctr"/>
-                </a:tc>
-                <a:tc>
-                  <a:txBody>
-                    <a:bodyPr/>
-                    <a:lstStyle/>
-                    <a:p>
-                      <a:pPr algn="ctr" fontAlgn="ctr"/>
-                      <a:r>
-                        <a:rPr lang="en-US" sz="2000" dirty="0">
-                          <a:effectLst/>
-                        </a:rPr>
-                        <a:t>0.194</a:t>
-                      </a:r>
-                    </a:p>
-                  </a:txBody>
-                  <a:tcPr marL="21771" marR="21771" marT="21771" marB="21771" anchor="ctr"/>
-                </a:tc>
-                <a:tc>
-                  <a:txBody>
-                    <a:bodyPr/>
-                    <a:lstStyle/>
-                    <a:p>
-                      <a:pPr algn="ctr" fontAlgn="ctr"/>
-                      <a:r>
-                        <a:rPr lang="en-US" sz="2000" dirty="0">
-                          <a:effectLst/>
-                        </a:rPr>
-                        <a:t>0.0778</a:t>
-                      </a:r>
-                    </a:p>
-                  </a:txBody>
-                  <a:tcPr marL="21771" marR="21771" marT="21771" marB="21771" anchor="ctr"/>
-                </a:tc>
-                <a:tc>
-                  <a:txBody>
-                    <a:bodyPr/>
-                    <a:lstStyle/>
-                    <a:p>
-                      <a:pPr algn="ctr" fontAlgn="ctr"/>
-                      <a:r>
-                        <a:rPr lang="en-US" sz="2000" dirty="0">
-                          <a:effectLst/>
-                        </a:rPr>
-                        <a:t>0.0343</a:t>
-                      </a:r>
-                    </a:p>
-                  </a:txBody>
-                  <a:tcPr marL="21771" marR="21771" marT="21771" marB="21771" anchor="ctr"/>
-                </a:tc>
-                <a:tc>
-                  <a:txBody>
-                    <a:bodyPr/>
-                    <a:lstStyle/>
-                    <a:p>
-                      <a:pPr algn="ctr" fontAlgn="ctr"/>
-                      <a:r>
-                        <a:rPr lang="en-US" sz="2000" dirty="0">
-                          <a:effectLst/>
-                        </a:rPr>
-                        <a:t>0.133</a:t>
-                      </a:r>
-                    </a:p>
-                  </a:txBody>
-                  <a:tcPr marL="21771" marR="21771" marT="21771" marB="21771" anchor="ctr"/>
-                </a:tc>
-                <a:tc>
-                  <a:txBody>
-                    <a:bodyPr/>
-                    <a:lstStyle/>
-                    <a:p>
-                      <a:pPr algn="ctr" fontAlgn="ctr"/>
-                      <a:r>
-                        <a:rPr lang="en-US" sz="2000" dirty="0">
-                          <a:effectLst/>
-                        </a:rPr>
-                        <a:t>0.270</a:t>
-                      </a:r>
-                    </a:p>
-                  </a:txBody>
-                  <a:tcPr marL="21771" marR="21771" marT="21771" marB="21771" anchor="ctr"/>
-                </a:tc>
-                <a:tc>
-                  <a:txBody>
-                    <a:bodyPr/>
-                    <a:lstStyle/>
-                    <a:p>
-                      <a:pPr algn="ctr" fontAlgn="ctr"/>
-                      <a:r>
-                        <a:rPr lang="en-US" sz="2000" dirty="0">
-                          <a:effectLst/>
-                        </a:rPr>
-                        <a:t>0.144</a:t>
-                      </a:r>
-                    </a:p>
-                  </a:txBody>
-                  <a:tcPr marL="21771" marR="21771" marT="21771" marB="21771" anchor="ctr"/>
-                </a:tc>
-                <a:tc>
-                  <a:txBody>
-                    <a:bodyPr/>
-                    <a:lstStyle/>
-                    <a:p>
-                      <a:pPr algn="ctr" fontAlgn="ctr"/>
-                      <a:r>
-                        <a:rPr lang="en-US" sz="2000" dirty="0">
-                          <a:effectLst/>
-                        </a:rPr>
-                        <a:t>0.0965</a:t>
-                      </a:r>
-                    </a:p>
-                  </a:txBody>
-                  <a:tcPr marL="21771" marR="21771" marT="21771" marB="21771" anchor="ctr"/>
-                </a:tc>
-                <a:tc>
-                  <a:txBody>
-                    <a:bodyPr/>
-                    <a:lstStyle/>
-                    <a:p>
-                      <a:pPr algn="ctr" fontAlgn="ctr"/>
-                      <a:r>
-                        <a:rPr lang="en-US" sz="2000" dirty="0">
-                          <a:effectLst/>
-                        </a:rPr>
-                        <a:t>0.450</a:t>
-                      </a:r>
-                    </a:p>
-                  </a:txBody>
-                  <a:tcPr marL="21771" marR="21771" marT="21771" marB="21771" anchor="ctr"/>
-                </a:tc>
-                <a:extLst>
-                  <a:ext uri="{0D108BD9-81ED-4DB2-BD59-A6C34878D82A}">
-                    <a16:rowId xmlns:a16="http://schemas.microsoft.com/office/drawing/2014/main" val="2467148437"/>
-                  </a:ext>
-                </a:extLst>
-              </a:tr>
-            </a:tbl>
-          </a:graphicData>
-        </a:graphic>
-      </p:graphicFrame>
+              <a:t>Embeddings learned from scratch</a:t>
+            </a:r>
+          </a:p>
+          <a:p>
+            <a:endParaRPr lang="en-US" sz="2600" dirty="0"/>
+          </a:p>
+        </p:txBody>
+      </p:sp>
     </p:spTree>
     <p:extLst>
       <p:ext uri="{BB962C8B-B14F-4D97-AF65-F5344CB8AC3E}">
-        <p14:creationId xmlns:p14="http://schemas.microsoft.com/office/powerpoint/2010/main" val="3009043558"/>
+        <p14:creationId xmlns:p14="http://schemas.microsoft.com/office/powerpoint/2010/main" val="474572721"/>
       </p:ext>
     </p:extLst>
   </p:cSld>
@@ -10282,7 +8387,7 @@
           <p:nvPr/>
         </p:nvPicPr>
         <p:blipFill>
-          <a:blip r:embed="rId4">
+          <a:blip r:embed="rId4" cstate="print">
             <a:extLst>
               <a:ext uri="{28A0092B-C50C-407E-A947-70E740481C1C}">
                 <a14:useLocalDpi xmlns:a14="http://schemas.microsoft.com/office/drawing/2010/main" val="0"/>
@@ -14462,7 +12567,7 @@
           <a:p>
             <a:r>
               <a:rPr lang="en-US" sz="2800" i="1" dirty="0"/>
-              <a:t>Baseline Model Structure  (RNN + LSTM)</a:t>
+              <a:t>Baseline Model Structure  (CNN + LSTM)</a:t>
             </a:r>
           </a:p>
         </p:txBody>
@@ -14540,6 +12645,57 @@
             <a:endParaRPr lang="en-US" sz="3600" b="1" dirty="0">
               <a:latin typeface="+mj-lt"/>
             </a:endParaRPr>
+          </a:p>
+        </p:txBody>
+      </p:sp>
+      <p:sp>
+        <p:nvSpPr>
+          <p:cNvPr id="9" name="Rectangle 8">
+            <a:extLst>
+              <a:ext uri="{FF2B5EF4-FFF2-40B4-BE49-F238E27FC236}">
+                <a16:creationId xmlns:a16="http://schemas.microsoft.com/office/drawing/2014/main" id="{84251EF6-90AB-497E-8A4C-7BCAF233393F}"/>
+              </a:ext>
+            </a:extLst>
+          </p:cNvPr>
+          <p:cNvSpPr/>
+          <p:nvPr/>
+        </p:nvSpPr>
+        <p:spPr>
+          <a:xfrm>
+            <a:off x="7396482" y="5879439"/>
+            <a:ext cx="6789174" cy="338554"/>
+          </a:xfrm>
+          <a:prstGeom prst="rect">
+            <a:avLst/>
+          </a:prstGeom>
+        </p:spPr>
+        <p:txBody>
+          <a:bodyPr wrap="square">
+            <a:spAutoFit/>
+          </a:bodyPr>
+          <a:lstStyle/>
+          <a:p>
+            <a:r>
+              <a:rPr lang="fr-FR" sz="1600" dirty="0"/>
+              <a:t>Sources: Image </a:t>
+            </a:r>
+            <a:r>
+              <a:rPr lang="fr-FR" sz="1600" dirty="0" err="1"/>
+              <a:t>adapted</a:t>
+            </a:r>
+            <a:r>
+              <a:rPr lang="fr-FR" sz="1600" dirty="0"/>
+              <a:t> </a:t>
+            </a:r>
+            <a:r>
+              <a:rPr lang="fr-FR" sz="1600" dirty="0" err="1"/>
+              <a:t>from</a:t>
+            </a:r>
+            <a:r>
+              <a:rPr lang="fr-FR" sz="1600" dirty="0"/>
+              <a:t> Lu, X. et al. (2018).</a:t>
+            </a:r>
+            <a:endParaRPr lang="en-US" sz="1600" dirty="0"/>
           </a:p>
         </p:txBody>
       </p:sp>
@@ -14642,7 +12798,7 @@
           <a:p>
             <a:r>
               <a:rPr lang="en-US" sz="2800" b="1" i="1" dirty="0"/>
-              <a:t>Attention Model Structure (RNN + Attention + LSTM)</a:t>
+              <a:t>Attention Model Structure (CNN + Attention + LSTM)</a:t>
             </a:r>
           </a:p>
         </p:txBody>
@@ -14675,7 +12831,7 @@
         </p:blipFill>
         <p:spPr>
           <a:xfrm>
-            <a:off x="1011730" y="2425287"/>
+            <a:off x="1011730" y="2448339"/>
             <a:ext cx="9585932" cy="3244604"/>
           </a:xfrm>
           <a:prstGeom prst="rect">
@@ -14720,6 +12876,45 @@
             <a:endParaRPr lang="en-US" sz="3600" b="1" dirty="0">
               <a:latin typeface="+mj-lt"/>
             </a:endParaRPr>
+          </a:p>
+        </p:txBody>
+      </p:sp>
+      <p:sp>
+        <p:nvSpPr>
+          <p:cNvPr id="9" name="Rectangle 8">
+            <a:extLst>
+              <a:ext uri="{FF2B5EF4-FFF2-40B4-BE49-F238E27FC236}">
+                <a16:creationId xmlns:a16="http://schemas.microsoft.com/office/drawing/2014/main" id="{11A661CF-35F1-4213-81C4-E0E83E130934}"/>
+              </a:ext>
+            </a:extLst>
+          </p:cNvPr>
+          <p:cNvSpPr/>
+          <p:nvPr/>
+        </p:nvSpPr>
+        <p:spPr>
+          <a:xfrm>
+            <a:off x="7396482" y="5879439"/>
+            <a:ext cx="6789174" cy="338554"/>
+          </a:xfrm>
+          <a:prstGeom prst="rect">
+            <a:avLst/>
+          </a:prstGeom>
+        </p:spPr>
+        <p:txBody>
+          <a:bodyPr wrap="square">
+            <a:spAutoFit/>
+          </a:bodyPr>
+          <a:lstStyle/>
+          <a:p>
+            <a:r>
+              <a:rPr lang="en-US" sz="1600" dirty="0"/>
+              <a:t>Sources: Image adapted from Zhang, X. et al. (2019).</a:t>
+            </a:r>
+            <a:r>
+              <a:rPr lang="fr-FR" sz="1600" dirty="0"/>
+              <a:t> </a:t>
+            </a:r>
+            <a:endParaRPr lang="en-US" sz="1600" dirty="0"/>
           </a:p>
         </p:txBody>
       </p:sp>
@@ -14822,7 +13017,7 @@
           <a:p>
             <a:r>
               <a:rPr lang="en-US" sz="3000" b="1" i="1" dirty="0"/>
-              <a:t>Multi Attention Model Structure (RNN + Multi-Attention+ LSTM)</a:t>
+              <a:t>Multi Attention Model Structure (CNN + Multi-Attention+ LSTM)</a:t>
             </a:r>
           </a:p>
         </p:txBody>
@@ -14855,7 +13050,7 @@
         </p:blipFill>
         <p:spPr>
           <a:xfrm>
-            <a:off x="1474573" y="2271310"/>
+            <a:off x="1474573" y="2102033"/>
             <a:ext cx="8113341" cy="3851702"/>
           </a:xfrm>
           <a:prstGeom prst="rect">
@@ -14900,6 +13095,40 @@
             <a:endParaRPr lang="en-US" sz="3600" b="1" dirty="0">
               <a:latin typeface="+mj-lt"/>
             </a:endParaRPr>
+          </a:p>
+        </p:txBody>
+      </p:sp>
+      <p:sp>
+        <p:nvSpPr>
+          <p:cNvPr id="2" name="Rectangle 1">
+            <a:extLst>
+              <a:ext uri="{FF2B5EF4-FFF2-40B4-BE49-F238E27FC236}">
+                <a16:creationId xmlns:a16="http://schemas.microsoft.com/office/drawing/2014/main" id="{3A7C62BE-1B81-45E4-8798-A8AAC201B5BF}"/>
+              </a:ext>
+            </a:extLst>
+          </p:cNvPr>
+          <p:cNvSpPr/>
+          <p:nvPr/>
+        </p:nvSpPr>
+        <p:spPr>
+          <a:xfrm>
+            <a:off x="7819104" y="5953735"/>
+            <a:ext cx="6789174" cy="338554"/>
+          </a:xfrm>
+          <a:prstGeom prst="rect">
+            <a:avLst/>
+          </a:prstGeom>
+        </p:spPr>
+        <p:txBody>
+          <a:bodyPr wrap="square">
+            <a:spAutoFit/>
+          </a:bodyPr>
+          <a:lstStyle/>
+          <a:p>
+            <a:r>
+              <a:rPr lang="en-US" sz="1600" dirty="0"/>
+              <a:t>Sources: Image adapted from Li, Y. et al. (2020).</a:t>
+            </a:r>
           </a:p>
         </p:txBody>
       </p:sp>

</xml_diff>

<commit_message>
Modified slides according to the feedback issue
</commit_message>
<xml_diff>
--- a/docs/final_presentation.pptx
+++ b/docs/final_presentation.pptx
@@ -6627,7 +6627,7 @@
             </a:r>
             <a:r>
               <a:rPr lang="en-US" dirty="0"/>
-              <a:t>: : Evaluation Metrics</a:t>
+              <a:t>: Evaluation Metrics</a:t>
             </a:r>
           </a:p>
         </p:txBody>
@@ -6852,8 +6852,8 @@
         </p:nvSpPr>
         <p:spPr>
           <a:xfrm>
-            <a:off x="1051564" y="243934"/>
-            <a:ext cx="11140436" cy="1325563"/>
+            <a:off x="1140052" y="325048"/>
+            <a:ext cx="9930636" cy="1325563"/>
           </a:xfrm>
         </p:spPr>
         <p:txBody>
@@ -6866,7 +6866,7 @@
                   <a:prstClr val="black"/>
                 </a:solidFill>
               </a:rPr>
-              <a:t>Evaluation scores from the best model of each structure</a:t>
+              <a:t>The Baseline Model Shows The Best Performance</a:t>
             </a:r>
             <a:endParaRPr lang="en-US" dirty="0"/>
           </a:p>
@@ -6934,10 +6934,10 @@
       </p:sp>
       <p:pic>
         <p:nvPicPr>
-          <p:cNvPr id="9" name="Picture 8">
+          <p:cNvPr id="2" name="Picture 1">
             <a:extLst>
               <a:ext uri="{FF2B5EF4-FFF2-40B4-BE49-F238E27FC236}">
-                <a16:creationId xmlns:a16="http://schemas.microsoft.com/office/drawing/2014/main" id="{AC90C3CF-D4EF-488A-932B-D5389BBB9605}"/>
+                <a16:creationId xmlns:a16="http://schemas.microsoft.com/office/drawing/2014/main" id="{1B521F4E-E8D1-4078-91F9-1AE1E520F517}"/>
               </a:ext>
             </a:extLst>
           </p:cNvPr>
@@ -6954,8 +6954,8 @@
         </p:blipFill>
         <p:spPr>
           <a:xfrm>
-            <a:off x="5114055" y="1620772"/>
-            <a:ext cx="6749319" cy="4138849"/>
+            <a:off x="5191432" y="1613740"/>
+            <a:ext cx="6558450" cy="4084017"/>
           </a:xfrm>
           <a:prstGeom prst="rect">
             <a:avLst/>
@@ -7060,12 +7060,8 @@
           <a:lstStyle/>
           <a:p>
             <a:r>
-              <a:rPr lang="en-US" sz="3600" b="1" dirty="0">
-                <a:solidFill>
-                  <a:prstClr val="black"/>
-                </a:solidFill>
-              </a:rPr>
-              <a:t>Evaluation scores from the best model of each structure</a:t>
+              <a:rPr lang="en-US" dirty="0"/>
+              <a:t>Models Show Poor Generalization Capabilities</a:t>
             </a:r>
             <a:endParaRPr lang="en-US" sz="3600" b="1" dirty="0"/>
           </a:p>
@@ -7073,10 +7069,10 @@
       </p:sp>
       <p:sp>
         <p:nvSpPr>
-          <p:cNvPr id="7" name="TextBox 6">
+          <p:cNvPr id="11" name="TextBox 10">
             <a:extLst>
               <a:ext uri="{FF2B5EF4-FFF2-40B4-BE49-F238E27FC236}">
-                <a16:creationId xmlns:a16="http://schemas.microsoft.com/office/drawing/2014/main" id="{F1B81E3C-A6FF-4346-92A6-F2077641832B}"/>
+                <a16:creationId xmlns:a16="http://schemas.microsoft.com/office/drawing/2014/main" id="{F44A93B5-C8A9-4089-A8A9-51475FDE2A1B}"/>
               </a:ext>
             </a:extLst>
           </p:cNvPr>
@@ -7085,8 +7081,8 @@
         </p:nvSpPr>
         <p:spPr>
           <a:xfrm>
-            <a:off x="804223" y="2481147"/>
-            <a:ext cx="4382161" cy="892552"/>
+            <a:off x="575980" y="1546168"/>
+            <a:ext cx="4615452" cy="892552"/>
           </a:xfrm>
           <a:prstGeom prst="rect">
             <a:avLst/>
@@ -7099,9 +7095,13 @@
           </a:bodyPr>
           <a:lstStyle/>
           <a:p>
+            <a:pPr marL="457200" indent="-457200">
+              <a:buFont typeface="Arial" panose="020B0604020202020204" pitchFamily="34" charset="0"/>
+              <a:buChar char="•"/>
+            </a:pPr>
             <a:r>
               <a:rPr lang="en-US" sz="2600" dirty="0"/>
-              <a:t>Test data and train data are from </a:t>
+              <a:t>Test data and train data are from the </a:t>
             </a:r>
             <a:r>
               <a:rPr lang="en-US" sz="2600" b="1" dirty="0"/>
@@ -7114,47 +7114,12 @@
           </a:p>
         </p:txBody>
       </p:sp>
-      <p:sp>
-        <p:nvSpPr>
-          <p:cNvPr id="8" name="TextBox 7">
+      <p:pic>
+        <p:nvPicPr>
+          <p:cNvPr id="2" name="Picture 1">
             <a:extLst>
               <a:ext uri="{FF2B5EF4-FFF2-40B4-BE49-F238E27FC236}">
-                <a16:creationId xmlns:a16="http://schemas.microsoft.com/office/drawing/2014/main" id="{13AC1009-D7F3-E74B-8E01-EC694A547454}"/>
-              </a:ext>
-            </a:extLst>
-          </p:cNvPr>
-          <p:cNvSpPr txBox="1"/>
-          <p:nvPr/>
-        </p:nvSpPr>
-        <p:spPr>
-          <a:xfrm>
-            <a:off x="804223" y="1730485"/>
-            <a:ext cx="4221990" cy="492443"/>
-          </a:xfrm>
-          <a:prstGeom prst="rect">
-            <a:avLst/>
-          </a:prstGeom>
-          <a:noFill/>
-        </p:spPr>
-        <p:txBody>
-          <a:bodyPr wrap="none" rtlCol="0">
-            <a:spAutoFit/>
-          </a:bodyPr>
-          <a:lstStyle/>
-          <a:p>
-            <a:r>
-              <a:rPr lang="en-US" sz="2600" b="1" dirty="0"/>
-              <a:t>Testing Model Generalization</a:t>
-            </a:r>
-          </a:p>
-        </p:txBody>
-      </p:sp>
-      <p:pic>
-        <p:nvPicPr>
-          <p:cNvPr id="10" name="Picture 9">
-            <a:extLst>
-              <a:ext uri="{FF2B5EF4-FFF2-40B4-BE49-F238E27FC236}">
-                <a16:creationId xmlns:a16="http://schemas.microsoft.com/office/drawing/2014/main" id="{70C88513-638D-4C4B-88E7-D3E2CA46499E}"/>
+                <a16:creationId xmlns:a16="http://schemas.microsoft.com/office/drawing/2014/main" id="{B914C00B-6202-4040-952E-C92339880A45}"/>
               </a:ext>
             </a:extLst>
           </p:cNvPr>
@@ -7171,8 +7136,8 @@
         </p:blipFill>
         <p:spPr>
           <a:xfrm>
-            <a:off x="4908224" y="1480816"/>
-            <a:ext cx="6704906" cy="4191335"/>
+            <a:off x="5191431" y="1517855"/>
+            <a:ext cx="6603225" cy="4160274"/>
           </a:xfrm>
           <a:prstGeom prst="rect">
             <a:avLst/>
@@ -12567,7 +12532,7 @@
           <a:p>
             <a:r>
               <a:rPr lang="en-US" sz="2800" i="1" dirty="0"/>
-              <a:t>Baseline Model Structure  (CNN + LSTM)</a:t>
+              <a:t>Baseline Model Architecture  (CNN + LSTM)</a:t>
             </a:r>
           </a:p>
         </p:txBody>
@@ -12798,7 +12763,15 @@
           <a:p>
             <a:r>
               <a:rPr lang="en-US" sz="2800" b="1" i="1" dirty="0"/>
-              <a:t>Attention Model Structure (CNN + Attention + LSTM)</a:t>
+              <a:t>Attention Model </a:t>
+            </a:r>
+            <a:r>
+              <a:rPr lang="en-US" sz="2800" i="1" dirty="0"/>
+              <a:t>Architecture</a:t>
+            </a:r>
+            <a:r>
+              <a:rPr lang="en-US" sz="2800" b="1" i="1" dirty="0"/>
+              <a:t> (CNN + Attention + LSTM)</a:t>
             </a:r>
           </a:p>
         </p:txBody>
@@ -13016,8 +12989,16 @@
           <a:lstStyle/>
           <a:p>
             <a:r>
-              <a:rPr lang="en-US" sz="3000" b="1" i="1" dirty="0"/>
-              <a:t>Multi Attention Model Structure (CNN + Multi-Attention+ LSTM)</a:t>
+              <a:rPr lang="en-US" sz="2800" b="1" i="1" dirty="0"/>
+              <a:t>Multi Attention Model </a:t>
+            </a:r>
+            <a:r>
+              <a:rPr lang="en-US" sz="2800" i="1" dirty="0"/>
+              <a:t>Architecture </a:t>
+            </a:r>
+            <a:r>
+              <a:rPr lang="en-US" sz="2800" b="1" i="1" dirty="0"/>
+              <a:t>(CNN + Multi-Attention+ LSTM)</a:t>
             </a:r>
           </a:p>
         </p:txBody>

</xml_diff>